<commit_message>
modifed similarity results of microbenchmarks
</commit_message>
<xml_diff>
--- a/microbenchmark/Instruction analysis/Instruction Variance.pptx
+++ b/microbenchmark/Instruction analysis/Instruction Variance.pptx
@@ -246,7 +246,7 @@
           <a:p>
             <a:fld id="{654FCD81-FB35-8745-A85C-DABBA4837C45}" type="datetimeFigureOut">
               <a:rPr lang="en-US" smtClean="0"/>
-              <a:t>5/18/16</a:t>
+              <a:t>5/20/16</a:t>
             </a:fld>
             <a:endParaRPr lang="en-US"/>
           </a:p>
@@ -416,7 +416,7 @@
           <a:p>
             <a:fld id="{654FCD81-FB35-8745-A85C-DABBA4837C45}" type="datetimeFigureOut">
               <a:rPr lang="en-US" smtClean="0"/>
-              <a:t>5/18/16</a:t>
+              <a:t>5/20/16</a:t>
             </a:fld>
             <a:endParaRPr lang="en-US"/>
           </a:p>
@@ -596,7 +596,7 @@
           <a:p>
             <a:fld id="{654FCD81-FB35-8745-A85C-DABBA4837C45}" type="datetimeFigureOut">
               <a:rPr lang="en-US" smtClean="0"/>
-              <a:t>5/18/16</a:t>
+              <a:t>5/20/16</a:t>
             </a:fld>
             <a:endParaRPr lang="en-US"/>
           </a:p>
@@ -766,7 +766,7 @@
           <a:p>
             <a:fld id="{654FCD81-FB35-8745-A85C-DABBA4837C45}" type="datetimeFigureOut">
               <a:rPr lang="en-US" smtClean="0"/>
-              <a:t>5/18/16</a:t>
+              <a:t>5/20/16</a:t>
             </a:fld>
             <a:endParaRPr lang="en-US"/>
           </a:p>
@@ -1012,7 +1012,7 @@
           <a:p>
             <a:fld id="{654FCD81-FB35-8745-A85C-DABBA4837C45}" type="datetimeFigureOut">
               <a:rPr lang="en-US" smtClean="0"/>
-              <a:t>5/18/16</a:t>
+              <a:t>5/20/16</a:t>
             </a:fld>
             <a:endParaRPr lang="en-US"/>
           </a:p>
@@ -1244,7 +1244,7 @@
           <a:p>
             <a:fld id="{654FCD81-FB35-8745-A85C-DABBA4837C45}" type="datetimeFigureOut">
               <a:rPr lang="en-US" smtClean="0"/>
-              <a:t>5/18/16</a:t>
+              <a:t>5/20/16</a:t>
             </a:fld>
             <a:endParaRPr lang="en-US"/>
           </a:p>
@@ -1611,7 +1611,7 @@
           <a:p>
             <a:fld id="{654FCD81-FB35-8745-A85C-DABBA4837C45}" type="datetimeFigureOut">
               <a:rPr lang="en-US" smtClean="0"/>
-              <a:t>5/18/16</a:t>
+              <a:t>5/20/16</a:t>
             </a:fld>
             <a:endParaRPr lang="en-US"/>
           </a:p>
@@ -1729,7 +1729,7 @@
           <a:p>
             <a:fld id="{654FCD81-FB35-8745-A85C-DABBA4837C45}" type="datetimeFigureOut">
               <a:rPr lang="en-US" smtClean="0"/>
-              <a:t>5/18/16</a:t>
+              <a:t>5/20/16</a:t>
             </a:fld>
             <a:endParaRPr lang="en-US"/>
           </a:p>
@@ -1824,7 +1824,7 @@
           <a:p>
             <a:fld id="{654FCD81-FB35-8745-A85C-DABBA4837C45}" type="datetimeFigureOut">
               <a:rPr lang="en-US" smtClean="0"/>
-              <a:t>5/18/16</a:t>
+              <a:t>5/20/16</a:t>
             </a:fld>
             <a:endParaRPr lang="en-US"/>
           </a:p>
@@ -2101,7 +2101,7 @@
           <a:p>
             <a:fld id="{654FCD81-FB35-8745-A85C-DABBA4837C45}" type="datetimeFigureOut">
               <a:rPr lang="en-US" smtClean="0"/>
-              <a:t>5/18/16</a:t>
+              <a:t>5/20/16</a:t>
             </a:fld>
             <a:endParaRPr lang="en-US"/>
           </a:p>
@@ -2354,7 +2354,7 @@
           <a:p>
             <a:fld id="{654FCD81-FB35-8745-A85C-DABBA4837C45}" type="datetimeFigureOut">
               <a:rPr lang="en-US" smtClean="0"/>
-              <a:t>5/18/16</a:t>
+              <a:t>5/20/16</a:t>
             </a:fld>
             <a:endParaRPr lang="en-US"/>
           </a:p>
@@ -2567,7 +2567,7 @@
           <a:p>
             <a:fld id="{654FCD81-FB35-8745-A85C-DABBA4837C45}" type="datetimeFigureOut">
               <a:rPr lang="en-US" smtClean="0"/>
-              <a:t>5/18/16</a:t>
+              <a:t>5/20/16</a:t>
             </a:fld>
             <a:endParaRPr lang="en-US"/>
           </a:p>
@@ -2981,14 +2981,14 @@
           <p:nvPr>
             <p:extLst>
               <p:ext uri="{D42A27DB-BD31-4B8C-83A1-F6EECF244321}">
-                <p14:modId xmlns:p14="http://schemas.microsoft.com/office/powerpoint/2010/main" val="353530226"/>
+                <p14:modId xmlns:p14="http://schemas.microsoft.com/office/powerpoint/2010/main" val="1370338130"/>
               </p:ext>
             </p:extLst>
           </p:nvPr>
         </p:nvGraphicFramePr>
         <p:xfrm>
           <a:off x="1537731" y="946206"/>
-          <a:ext cx="8128000" cy="4572000"/>
+          <a:ext cx="8128000" cy="7315200"/>
         </p:xfrm>
         <a:graphic>
           <a:graphicData uri="http://schemas.openxmlformats.org/drawingml/2006/table">
@@ -3308,6 +3308,579 @@
                           <a:latin typeface="+mn-lt"/>
                           <a:ea typeface="+mn-ea"/>
                           <a:cs typeface="+mn-cs"/>
+                        </a:rPr>
+                        <a:t>}</a:t>
+                      </a:r>
+                    </a:p>
+                    <a:p>
+                      <a:r>
+                        <a:rPr lang="en-US" dirty="0" smtClean="0">
+                          <a:solidFill>
+                            <a:schemeClr val="tx1"/>
+                          </a:solidFill>
+                        </a:rPr>
+                        <a:t>main(){</a:t>
+                      </a:r>
+                    </a:p>
+                    <a:p>
+                      <a:r>
+                        <a:rPr lang="en-US" dirty="0" smtClean="0">
+                          <a:solidFill>
+                            <a:schemeClr val="tx1"/>
+                          </a:solidFill>
+                        </a:rPr>
+                        <a:t>    </a:t>
+                      </a:r>
+                      <a:r>
+                        <a:rPr lang="en-US" baseline="0" dirty="0" smtClean="0">
+                          <a:solidFill>
+                            <a:schemeClr val="tx1"/>
+                          </a:solidFill>
+                        </a:rPr>
+                        <a:t> </a:t>
+                      </a:r>
+                      <a:r>
+                        <a:rPr lang="en-US" dirty="0" smtClean="0">
+                          <a:solidFill>
+                            <a:schemeClr val="tx1"/>
+                          </a:solidFill>
+                        </a:rPr>
+                        <a:t>// Allocate memory for each vector on GPU    </a:t>
+                      </a:r>
+                    </a:p>
+                    <a:p>
+                      <a:r>
+                        <a:rPr lang="en-US" dirty="0" smtClean="0">
+                          <a:solidFill>
+                            <a:schemeClr val="tx1"/>
+                          </a:solidFill>
+                        </a:rPr>
+                        <a:t>    </a:t>
+                      </a:r>
+                      <a:r>
+                        <a:rPr lang="en-US" dirty="0" err="1" smtClean="0">
+                          <a:solidFill>
+                            <a:schemeClr val="tx1"/>
+                          </a:solidFill>
+                        </a:rPr>
+                        <a:t>cudaMalloc</a:t>
+                      </a:r>
+                      <a:r>
+                        <a:rPr lang="en-US" dirty="0" smtClean="0">
+                          <a:solidFill>
+                            <a:schemeClr val="tx1"/>
+                          </a:solidFill>
+                        </a:rPr>
+                        <a:t>(&amp;</a:t>
+                      </a:r>
+                      <a:r>
+                        <a:rPr lang="en-US" dirty="0" err="1" smtClean="0">
+                          <a:solidFill>
+                            <a:schemeClr val="tx1"/>
+                          </a:solidFill>
+                        </a:rPr>
+                        <a:t>d_a</a:t>
+                      </a:r>
+                      <a:r>
+                        <a:rPr lang="en-US" dirty="0" smtClean="0">
+                          <a:solidFill>
+                            <a:schemeClr val="tx1"/>
+                          </a:solidFill>
+                        </a:rPr>
+                        <a:t>, bytes);    </a:t>
+                      </a:r>
+                    </a:p>
+                    <a:p>
+                      <a:r>
+                        <a:rPr lang="en-US" dirty="0" smtClean="0">
+                          <a:solidFill>
+                            <a:schemeClr val="tx1"/>
+                          </a:solidFill>
+                        </a:rPr>
+                        <a:t>    </a:t>
+                      </a:r>
+                      <a:r>
+                        <a:rPr lang="en-US" dirty="0" err="1" smtClean="0">
+                          <a:solidFill>
+                            <a:schemeClr val="tx1"/>
+                          </a:solidFill>
+                        </a:rPr>
+                        <a:t>cudaMalloc</a:t>
+                      </a:r>
+                      <a:r>
+                        <a:rPr lang="en-US" dirty="0" smtClean="0">
+                          <a:solidFill>
+                            <a:schemeClr val="tx1"/>
+                          </a:solidFill>
+                        </a:rPr>
+                        <a:t>(&amp;</a:t>
+                      </a:r>
+                      <a:r>
+                        <a:rPr lang="en-US" dirty="0" err="1" smtClean="0">
+                          <a:solidFill>
+                            <a:schemeClr val="tx1"/>
+                          </a:solidFill>
+                        </a:rPr>
+                        <a:t>d_b</a:t>
+                      </a:r>
+                      <a:r>
+                        <a:rPr lang="en-US" dirty="0" smtClean="0">
+                          <a:solidFill>
+                            <a:schemeClr val="tx1"/>
+                          </a:solidFill>
+                        </a:rPr>
+                        <a:t>, bytes); </a:t>
+                      </a:r>
+                    </a:p>
+                    <a:p>
+                      <a:pPr marL="0" marR="0" indent="0" algn="l" defTabSz="914400" rtl="0" eaLnBrk="1" fontAlgn="auto" latinLnBrk="0" hangingPunct="1">
+                        <a:lnSpc>
+                          <a:spcPct val="100000"/>
+                        </a:lnSpc>
+                        <a:spcBef>
+                          <a:spcPts val="0"/>
+                        </a:spcBef>
+                        <a:spcAft>
+                          <a:spcPts val="0"/>
+                        </a:spcAft>
+                        <a:buClrTx/>
+                        <a:buSzTx/>
+                        <a:buFontTx/>
+                        <a:buNone/>
+                        <a:tabLst/>
+                        <a:defRPr/>
+                      </a:pPr>
+                      <a:r>
+                        <a:rPr lang="en-US" sz="1800" b="1" kern="1200" dirty="0" smtClean="0">
+                          <a:solidFill>
+                            <a:schemeClr val="tx1"/>
+                          </a:solidFill>
+                          <a:effectLst/>
+                          <a:latin typeface="+mn-lt"/>
+                          <a:ea typeface="+mn-ea"/>
+                          <a:cs typeface="+mn-cs"/>
+                        </a:rPr>
+                        <a:t>    // Copy host vectors to device    </a:t>
+                      </a:r>
+                    </a:p>
+                    <a:p>
+                      <a:pPr marL="0" marR="0" indent="0" algn="l" defTabSz="914400" rtl="0" eaLnBrk="1" fontAlgn="auto" latinLnBrk="0" hangingPunct="1">
+                        <a:lnSpc>
+                          <a:spcPct val="100000"/>
+                        </a:lnSpc>
+                        <a:spcBef>
+                          <a:spcPts val="0"/>
+                        </a:spcBef>
+                        <a:spcAft>
+                          <a:spcPts val="0"/>
+                        </a:spcAft>
+                        <a:buClrTx/>
+                        <a:buSzTx/>
+                        <a:buFontTx/>
+                        <a:buNone/>
+                        <a:tabLst/>
+                        <a:defRPr/>
+                      </a:pPr>
+                      <a:r>
+                        <a:rPr lang="en-US" sz="1800" b="1" kern="1200" dirty="0" smtClean="0">
+                          <a:solidFill>
+                            <a:schemeClr val="tx1"/>
+                          </a:solidFill>
+                          <a:effectLst/>
+                          <a:latin typeface="+mn-lt"/>
+                          <a:ea typeface="+mn-ea"/>
+                          <a:cs typeface="+mn-cs"/>
+                        </a:rPr>
+                        <a:t>    </a:t>
+                      </a:r>
+                      <a:r>
+                        <a:rPr lang="en-US" sz="1800" b="1" kern="1200" dirty="0" err="1" smtClean="0">
+                          <a:solidFill>
+                            <a:schemeClr val="tx1"/>
+                          </a:solidFill>
+                          <a:effectLst/>
+                          <a:latin typeface="+mn-lt"/>
+                          <a:ea typeface="+mn-ea"/>
+                          <a:cs typeface="+mn-cs"/>
+                        </a:rPr>
+                        <a:t>cudaMemcpy</a:t>
+                      </a:r>
+                      <a:r>
+                        <a:rPr lang="en-US" sz="1800" b="1" kern="1200" dirty="0" smtClean="0">
+                          <a:solidFill>
+                            <a:schemeClr val="tx1"/>
+                          </a:solidFill>
+                          <a:effectLst/>
+                          <a:latin typeface="+mn-lt"/>
+                          <a:ea typeface="+mn-ea"/>
+                          <a:cs typeface="+mn-cs"/>
+                        </a:rPr>
+                        <a:t>( </a:t>
+                      </a:r>
+                      <a:r>
+                        <a:rPr lang="en-US" sz="1800" b="1" kern="1200" dirty="0" err="1" smtClean="0">
+                          <a:solidFill>
+                            <a:schemeClr val="tx1"/>
+                          </a:solidFill>
+                          <a:effectLst/>
+                          <a:latin typeface="+mn-lt"/>
+                          <a:ea typeface="+mn-ea"/>
+                          <a:cs typeface="+mn-cs"/>
+                        </a:rPr>
+                        <a:t>d_a</a:t>
+                      </a:r>
+                      <a:r>
+                        <a:rPr lang="en-US" sz="1800" b="1" kern="1200" dirty="0" smtClean="0">
+                          <a:solidFill>
+                            <a:schemeClr val="tx1"/>
+                          </a:solidFill>
+                          <a:effectLst/>
+                          <a:latin typeface="+mn-lt"/>
+                          <a:ea typeface="+mn-ea"/>
+                          <a:cs typeface="+mn-cs"/>
+                        </a:rPr>
+                        <a:t>, </a:t>
+                      </a:r>
+                      <a:r>
+                        <a:rPr lang="en-US" sz="1800" b="1" kern="1200" dirty="0" err="1" smtClean="0">
+                          <a:solidFill>
+                            <a:schemeClr val="tx1"/>
+                          </a:solidFill>
+                          <a:effectLst/>
+                          <a:latin typeface="+mn-lt"/>
+                          <a:ea typeface="+mn-ea"/>
+                          <a:cs typeface="+mn-cs"/>
+                        </a:rPr>
+                        <a:t>h_a</a:t>
+                      </a:r>
+                      <a:r>
+                        <a:rPr lang="en-US" sz="1800" b="1" kern="1200" dirty="0" smtClean="0">
+                          <a:solidFill>
+                            <a:schemeClr val="tx1"/>
+                          </a:solidFill>
+                          <a:effectLst/>
+                          <a:latin typeface="+mn-lt"/>
+                          <a:ea typeface="+mn-ea"/>
+                          <a:cs typeface="+mn-cs"/>
+                        </a:rPr>
+                        <a:t>, bytes, </a:t>
+                      </a:r>
+                      <a:r>
+                        <a:rPr lang="en-US" sz="1800" b="1" kern="1200" dirty="0" err="1" smtClean="0">
+                          <a:solidFill>
+                            <a:schemeClr val="tx1"/>
+                          </a:solidFill>
+                          <a:effectLst/>
+                          <a:latin typeface="+mn-lt"/>
+                          <a:ea typeface="+mn-ea"/>
+                          <a:cs typeface="+mn-cs"/>
+                        </a:rPr>
+                        <a:t>cudaMemcpyHostToDevice</a:t>
+                      </a:r>
+                      <a:r>
+                        <a:rPr lang="en-US" sz="1800" b="1" kern="1200" dirty="0" smtClean="0">
+                          <a:solidFill>
+                            <a:schemeClr val="tx1"/>
+                          </a:solidFill>
+                          <a:effectLst/>
+                          <a:latin typeface="+mn-lt"/>
+                          <a:ea typeface="+mn-ea"/>
+                          <a:cs typeface="+mn-cs"/>
+                        </a:rPr>
+                        <a:t>);    </a:t>
+                      </a:r>
+                    </a:p>
+                    <a:p>
+                      <a:pPr marL="0" marR="0" indent="0" algn="l" defTabSz="914400" rtl="0" eaLnBrk="1" fontAlgn="auto" latinLnBrk="0" hangingPunct="1">
+                        <a:lnSpc>
+                          <a:spcPct val="100000"/>
+                        </a:lnSpc>
+                        <a:spcBef>
+                          <a:spcPts val="0"/>
+                        </a:spcBef>
+                        <a:spcAft>
+                          <a:spcPts val="0"/>
+                        </a:spcAft>
+                        <a:buClrTx/>
+                        <a:buSzTx/>
+                        <a:buFontTx/>
+                        <a:buNone/>
+                        <a:tabLst/>
+                        <a:defRPr/>
+                      </a:pPr>
+                      <a:r>
+                        <a:rPr lang="en-US" sz="1800" b="1" kern="1200" dirty="0" smtClean="0">
+                          <a:solidFill>
+                            <a:schemeClr val="tx1"/>
+                          </a:solidFill>
+                          <a:effectLst/>
+                          <a:latin typeface="+mn-lt"/>
+                          <a:ea typeface="+mn-ea"/>
+                          <a:cs typeface="+mn-cs"/>
+                        </a:rPr>
+                        <a:t>    </a:t>
+                      </a:r>
+                      <a:r>
+                        <a:rPr lang="en-US" sz="1800" b="1" kern="1200" dirty="0" err="1" smtClean="0">
+                          <a:solidFill>
+                            <a:schemeClr val="tx1"/>
+                          </a:solidFill>
+                          <a:effectLst/>
+                          <a:latin typeface="+mn-lt"/>
+                          <a:ea typeface="+mn-ea"/>
+                          <a:cs typeface="+mn-cs"/>
+                        </a:rPr>
+                        <a:t>cudaMemcpy</a:t>
+                      </a:r>
+                      <a:r>
+                        <a:rPr lang="en-US" sz="1800" b="1" kern="1200" dirty="0" smtClean="0">
+                          <a:solidFill>
+                            <a:schemeClr val="tx1"/>
+                          </a:solidFill>
+                          <a:effectLst/>
+                          <a:latin typeface="+mn-lt"/>
+                          <a:ea typeface="+mn-ea"/>
+                          <a:cs typeface="+mn-cs"/>
+                        </a:rPr>
+                        <a:t>( </a:t>
+                      </a:r>
+                      <a:r>
+                        <a:rPr lang="en-US" sz="1800" b="1" kern="1200" dirty="0" err="1" smtClean="0">
+                          <a:solidFill>
+                            <a:schemeClr val="tx1"/>
+                          </a:solidFill>
+                          <a:effectLst/>
+                          <a:latin typeface="+mn-lt"/>
+                          <a:ea typeface="+mn-ea"/>
+                          <a:cs typeface="+mn-cs"/>
+                        </a:rPr>
+                        <a:t>d_b</a:t>
+                      </a:r>
+                      <a:r>
+                        <a:rPr lang="en-US" sz="1800" b="1" kern="1200" dirty="0" smtClean="0">
+                          <a:solidFill>
+                            <a:schemeClr val="tx1"/>
+                          </a:solidFill>
+                          <a:effectLst/>
+                          <a:latin typeface="+mn-lt"/>
+                          <a:ea typeface="+mn-ea"/>
+                          <a:cs typeface="+mn-cs"/>
+                        </a:rPr>
+                        <a:t>, </a:t>
+                      </a:r>
+                      <a:r>
+                        <a:rPr lang="en-US" sz="1800" b="1" kern="1200" dirty="0" err="1" smtClean="0">
+                          <a:solidFill>
+                            <a:schemeClr val="tx1"/>
+                          </a:solidFill>
+                          <a:effectLst/>
+                          <a:latin typeface="+mn-lt"/>
+                          <a:ea typeface="+mn-ea"/>
+                          <a:cs typeface="+mn-cs"/>
+                        </a:rPr>
+                        <a:t>h_b</a:t>
+                      </a:r>
+                      <a:r>
+                        <a:rPr lang="en-US" sz="1800" b="1" kern="1200" dirty="0" smtClean="0">
+                          <a:solidFill>
+                            <a:schemeClr val="tx1"/>
+                          </a:solidFill>
+                          <a:effectLst/>
+                          <a:latin typeface="+mn-lt"/>
+                          <a:ea typeface="+mn-ea"/>
+                          <a:cs typeface="+mn-cs"/>
+                        </a:rPr>
+                        <a:t>, bytes, </a:t>
+                      </a:r>
+                      <a:r>
+                        <a:rPr lang="en-US" sz="1800" b="1" kern="1200" dirty="0" err="1" smtClean="0">
+                          <a:solidFill>
+                            <a:schemeClr val="tx1"/>
+                          </a:solidFill>
+                          <a:effectLst/>
+                          <a:latin typeface="+mn-lt"/>
+                          <a:ea typeface="+mn-ea"/>
+                          <a:cs typeface="+mn-cs"/>
+                        </a:rPr>
+                        <a:t>cudaMemcpyHostToDevice</a:t>
+                      </a:r>
+                      <a:r>
+                        <a:rPr lang="en-US" sz="1800" b="1" kern="1200" dirty="0" smtClean="0">
+                          <a:solidFill>
+                            <a:schemeClr val="tx1"/>
+                          </a:solidFill>
+                          <a:effectLst/>
+                          <a:latin typeface="+mn-lt"/>
+                          <a:ea typeface="+mn-ea"/>
+                          <a:cs typeface="+mn-cs"/>
+                        </a:rPr>
+                        <a:t>);</a:t>
+                      </a:r>
+                    </a:p>
+                    <a:p>
+                      <a:pPr marL="0" marR="0" indent="0" algn="l" defTabSz="914400" rtl="0" eaLnBrk="1" fontAlgn="auto" latinLnBrk="0" hangingPunct="1">
+                        <a:lnSpc>
+                          <a:spcPct val="100000"/>
+                        </a:lnSpc>
+                        <a:spcBef>
+                          <a:spcPts val="0"/>
+                        </a:spcBef>
+                        <a:spcAft>
+                          <a:spcPts val="0"/>
+                        </a:spcAft>
+                        <a:buClrTx/>
+                        <a:buSzTx/>
+                        <a:buFontTx/>
+                        <a:buNone/>
+                        <a:tabLst/>
+                        <a:defRPr/>
+                      </a:pPr>
+                      <a:r>
+                        <a:rPr lang="en-US" sz="1800" b="1" kern="1200" dirty="0" smtClean="0">
+                          <a:solidFill>
+                            <a:schemeClr val="tx1"/>
+                          </a:solidFill>
+                          <a:effectLst/>
+                          <a:latin typeface="+mn-lt"/>
+                          <a:ea typeface="+mn-ea"/>
+                          <a:cs typeface="+mn-cs"/>
+                        </a:rPr>
+                        <a:t>     //Execution</a:t>
+                      </a:r>
+                    </a:p>
+                    <a:p>
+                      <a:pPr marL="0" marR="0" indent="0" algn="l" defTabSz="914400" rtl="0" eaLnBrk="1" fontAlgn="auto" latinLnBrk="0" hangingPunct="1">
+                        <a:lnSpc>
+                          <a:spcPct val="100000"/>
+                        </a:lnSpc>
+                        <a:spcBef>
+                          <a:spcPts val="0"/>
+                        </a:spcBef>
+                        <a:spcAft>
+                          <a:spcPts val="0"/>
+                        </a:spcAft>
+                        <a:buClrTx/>
+                        <a:buSzTx/>
+                        <a:buFontTx/>
+                        <a:buNone/>
+                        <a:tabLst/>
+                        <a:defRPr/>
+                      </a:pPr>
+                      <a:r>
+                        <a:rPr lang="en-US" sz="1800" b="1" kern="1200" dirty="0" smtClean="0">
+                          <a:solidFill>
+                            <a:schemeClr val="tx1"/>
+                          </a:solidFill>
+                          <a:effectLst/>
+                          <a:latin typeface="+mn-lt"/>
+                          <a:ea typeface="+mn-ea"/>
+                          <a:cs typeface="+mn-cs"/>
+                        </a:rPr>
+                        <a:t>    </a:t>
+                      </a:r>
+                      <a:r>
+                        <a:rPr lang="en-US" dirty="0" err="1" smtClean="0">
+                          <a:solidFill>
+                            <a:schemeClr val="tx1"/>
+                          </a:solidFill>
+                        </a:rPr>
+                        <a:t>vecAdd</a:t>
+                      </a:r>
+                      <a:r>
+                        <a:rPr lang="en-US" dirty="0" smtClean="0">
+                          <a:solidFill>
+                            <a:schemeClr val="tx1"/>
+                          </a:solidFill>
+                        </a:rPr>
+                        <a:t>&lt;&lt;&lt;</a:t>
+                      </a:r>
+                      <a:r>
+                        <a:rPr lang="en-US" dirty="0" err="1" smtClean="0">
+                          <a:solidFill>
+                            <a:schemeClr val="tx1"/>
+                          </a:solidFill>
+                        </a:rPr>
+                        <a:t>gridSize</a:t>
+                      </a:r>
+                      <a:r>
+                        <a:rPr lang="en-US" dirty="0" smtClean="0">
+                          <a:solidFill>
+                            <a:schemeClr val="tx1"/>
+                          </a:solidFill>
+                        </a:rPr>
+                        <a:t>, </a:t>
+                      </a:r>
+                      <a:r>
+                        <a:rPr lang="en-US" dirty="0" err="1" smtClean="0">
+                          <a:solidFill>
+                            <a:schemeClr val="tx1"/>
+                          </a:solidFill>
+                        </a:rPr>
+                        <a:t>blockSize</a:t>
+                      </a:r>
+                      <a:r>
+                        <a:rPr lang="en-US" dirty="0" smtClean="0">
+                          <a:solidFill>
+                            <a:schemeClr val="tx1"/>
+                          </a:solidFill>
+                        </a:rPr>
+                        <a:t>&gt;&gt;&gt;(</a:t>
+                      </a:r>
+                      <a:r>
+                        <a:rPr lang="en-US" dirty="0" err="1" smtClean="0">
+                          <a:solidFill>
+                            <a:schemeClr val="tx1"/>
+                          </a:solidFill>
+                        </a:rPr>
+                        <a:t>d_a</a:t>
+                      </a:r>
+                      <a:r>
+                        <a:rPr lang="en-US" dirty="0" smtClean="0">
+                          <a:solidFill>
+                            <a:schemeClr val="tx1"/>
+                          </a:solidFill>
+                        </a:rPr>
+                        <a:t>, </a:t>
+                      </a:r>
+                      <a:r>
+                        <a:rPr lang="en-US" dirty="0" err="1" smtClean="0">
+                          <a:solidFill>
+                            <a:schemeClr val="tx1"/>
+                          </a:solidFill>
+                        </a:rPr>
+                        <a:t>d_b</a:t>
+                      </a:r>
+                      <a:r>
+                        <a:rPr lang="en-US" dirty="0" smtClean="0">
+                          <a:solidFill>
+                            <a:schemeClr val="tx1"/>
+                          </a:solidFill>
+                        </a:rPr>
+                        <a:t>, </a:t>
+                      </a:r>
+                      <a:r>
+                        <a:rPr lang="en-US" dirty="0" err="1" smtClean="0">
+                          <a:solidFill>
+                            <a:schemeClr val="tx1"/>
+                          </a:solidFill>
+                        </a:rPr>
+                        <a:t>d_c</a:t>
+                      </a:r>
+                      <a:r>
+                        <a:rPr lang="en-US" dirty="0" smtClean="0">
+                          <a:solidFill>
+                            <a:schemeClr val="tx1"/>
+                          </a:solidFill>
+                        </a:rPr>
+                        <a:t>);</a:t>
+                      </a:r>
+                    </a:p>
+                    <a:p>
+                      <a:r>
+                        <a:rPr lang="en-US" dirty="0" smtClean="0">
+                          <a:solidFill>
+                            <a:schemeClr val="tx1"/>
+                          </a:solidFill>
                         </a:rPr>
                         <a:t>}</a:t>
                       </a:r>
@@ -3608,14 +4181,14 @@
           <p:nvPr>
             <p:extLst>
               <p:ext uri="{D42A27DB-BD31-4B8C-83A1-F6EECF244321}">
-                <p14:modId xmlns:p14="http://schemas.microsoft.com/office/powerpoint/2010/main" val="732617238"/>
+                <p14:modId xmlns:p14="http://schemas.microsoft.com/office/powerpoint/2010/main" val="184957576"/>
               </p:ext>
             </p:extLst>
           </p:nvPr>
         </p:nvGraphicFramePr>
         <p:xfrm>
-          <a:off x="2032000" y="719666"/>
-          <a:ext cx="8128000" cy="4297680"/>
+          <a:off x="2032000" y="-175684"/>
+          <a:ext cx="8128000" cy="7587351"/>
         </p:xfrm>
         <a:graphic>
           <a:graphicData uri="http://schemas.openxmlformats.org/drawingml/2006/table">
@@ -3626,7 +4199,7 @@
               <a:tblGrid>
                 <a:gridCol w="8128000"/>
               </a:tblGrid>
-              <a:tr h="370840">
+              <a:tr h="4574593">
                 <a:tc>
                   <a:txBody>
                     <a:bodyPr/>
@@ -4132,6 +4705,973 @@
                         <a:ea typeface="+mn-ea"/>
                         <a:cs typeface="+mn-cs"/>
                       </a:endParaRPr>
+                    </a:p>
+                    <a:p>
+                      <a:pPr marL="0" marR="0" indent="0" algn="l" defTabSz="914400" rtl="0" eaLnBrk="1" fontAlgn="auto" latinLnBrk="0" hangingPunct="1">
+                        <a:lnSpc>
+                          <a:spcPct val="100000"/>
+                        </a:lnSpc>
+                        <a:spcBef>
+                          <a:spcPts val="0"/>
+                        </a:spcBef>
+                        <a:spcAft>
+                          <a:spcPts val="0"/>
+                        </a:spcAft>
+                        <a:buClrTx/>
+                        <a:buSzTx/>
+                        <a:buFontTx/>
+                        <a:buNone/>
+                        <a:tabLst/>
+                        <a:defRPr/>
+                      </a:pPr>
+                      <a:r>
+                        <a:rPr lang="en-US" sz="1800" b="1" kern="1200" dirty="0" smtClean="0">
+                          <a:solidFill>
+                            <a:schemeClr val="tx1"/>
+                          </a:solidFill>
+                          <a:effectLst/>
+                          <a:latin typeface="+mn-lt"/>
+                          <a:ea typeface="+mn-ea"/>
+                          <a:cs typeface="+mn-cs"/>
+                        </a:rPr>
+                        <a:t>}</a:t>
+                      </a:r>
+                    </a:p>
+                    <a:p>
+                      <a:pPr marL="0" marR="0" indent="0" algn="l" defTabSz="914400" rtl="0" eaLnBrk="1" fontAlgn="auto" latinLnBrk="0" hangingPunct="1">
+                        <a:lnSpc>
+                          <a:spcPct val="100000"/>
+                        </a:lnSpc>
+                        <a:spcBef>
+                          <a:spcPts val="0"/>
+                        </a:spcBef>
+                        <a:spcAft>
+                          <a:spcPts val="0"/>
+                        </a:spcAft>
+                        <a:buClrTx/>
+                        <a:buSzTx/>
+                        <a:buFontTx/>
+                        <a:buNone/>
+                        <a:tabLst/>
+                        <a:defRPr/>
+                      </a:pPr>
+                      <a:r>
+                        <a:rPr lang="en-US" sz="1800" b="1" kern="1200" dirty="0" smtClean="0">
+                          <a:solidFill>
+                            <a:schemeClr val="tx1"/>
+                          </a:solidFill>
+                          <a:effectLst/>
+                          <a:latin typeface="+mn-lt"/>
+                          <a:ea typeface="+mn-ea"/>
+                          <a:cs typeface="+mn-cs"/>
+                        </a:rPr>
+                        <a:t>main(){</a:t>
+                      </a:r>
+                    </a:p>
+                    <a:p>
+                      <a:pPr marL="0" marR="0" indent="0" algn="l" defTabSz="914400" rtl="0" eaLnBrk="1" fontAlgn="auto" latinLnBrk="0" hangingPunct="1">
+                        <a:lnSpc>
+                          <a:spcPct val="100000"/>
+                        </a:lnSpc>
+                        <a:spcBef>
+                          <a:spcPts val="0"/>
+                        </a:spcBef>
+                        <a:spcAft>
+                          <a:spcPts val="0"/>
+                        </a:spcAft>
+                        <a:buClrTx/>
+                        <a:buSzTx/>
+                        <a:buFontTx/>
+                        <a:buNone/>
+                        <a:tabLst/>
+                        <a:defRPr/>
+                      </a:pPr>
+                      <a:r>
+                        <a:rPr lang="en-US" sz="1800" b="1" kern="1200" dirty="0" smtClean="0">
+                          <a:solidFill>
+                            <a:schemeClr val="tx1"/>
+                          </a:solidFill>
+                          <a:effectLst/>
+                          <a:latin typeface="+mn-lt"/>
+                          <a:ea typeface="+mn-ea"/>
+                          <a:cs typeface="+mn-cs"/>
+                        </a:rPr>
+                        <a:t>    // Allocate memory for each vector on GPU</a:t>
+                      </a:r>
+                    </a:p>
+                    <a:p>
+                      <a:pPr marL="0" marR="0" indent="0" algn="l" defTabSz="914400" rtl="0" eaLnBrk="1" fontAlgn="auto" latinLnBrk="0" hangingPunct="1">
+                        <a:lnSpc>
+                          <a:spcPct val="100000"/>
+                        </a:lnSpc>
+                        <a:spcBef>
+                          <a:spcPts val="0"/>
+                        </a:spcBef>
+                        <a:spcAft>
+                          <a:spcPts val="0"/>
+                        </a:spcAft>
+                        <a:buClrTx/>
+                        <a:buSzTx/>
+                        <a:buFontTx/>
+                        <a:buNone/>
+                        <a:tabLst/>
+                        <a:defRPr/>
+                      </a:pPr>
+                      <a:r>
+                        <a:rPr lang="en-US" sz="1800" b="1" kern="1200" baseline="0" dirty="0" smtClean="0">
+                          <a:solidFill>
+                            <a:schemeClr val="tx1"/>
+                          </a:solidFill>
+                          <a:effectLst/>
+                          <a:latin typeface="+mn-lt"/>
+                          <a:ea typeface="+mn-ea"/>
+                          <a:cs typeface="+mn-cs"/>
+                        </a:rPr>
+                        <a:t>    </a:t>
+                      </a:r>
+                      <a:r>
+                        <a:rPr lang="en-US" sz="1800" b="1" kern="1200" dirty="0" err="1" smtClean="0">
+                          <a:solidFill>
+                            <a:schemeClr val="tx1"/>
+                          </a:solidFill>
+                          <a:effectLst/>
+                          <a:latin typeface="+mn-lt"/>
+                          <a:ea typeface="+mn-ea"/>
+                          <a:cs typeface="+mn-cs"/>
+                        </a:rPr>
+                        <a:t>cudaMalloc</a:t>
+                      </a:r>
+                      <a:r>
+                        <a:rPr lang="en-US" sz="1800" b="1" kern="1200" dirty="0" smtClean="0">
+                          <a:solidFill>
+                            <a:schemeClr val="tx1"/>
+                          </a:solidFill>
+                          <a:effectLst/>
+                          <a:latin typeface="+mn-lt"/>
+                          <a:ea typeface="+mn-ea"/>
+                          <a:cs typeface="+mn-cs"/>
+                        </a:rPr>
+                        <a:t>(&amp;</a:t>
+                      </a:r>
+                      <a:r>
+                        <a:rPr lang="en-US" sz="1800" b="1" kern="1200" dirty="0" err="1" smtClean="0">
+                          <a:solidFill>
+                            <a:schemeClr val="tx1"/>
+                          </a:solidFill>
+                          <a:effectLst/>
+                          <a:latin typeface="+mn-lt"/>
+                          <a:ea typeface="+mn-ea"/>
+                          <a:cs typeface="+mn-cs"/>
+                        </a:rPr>
+                        <a:t>d_a</a:t>
+                      </a:r>
+                      <a:r>
+                        <a:rPr lang="en-US" sz="1800" b="1" kern="1200" dirty="0" smtClean="0">
+                          <a:solidFill>
+                            <a:schemeClr val="tx1"/>
+                          </a:solidFill>
+                          <a:effectLst/>
+                          <a:latin typeface="+mn-lt"/>
+                          <a:ea typeface="+mn-ea"/>
+                          <a:cs typeface="+mn-cs"/>
+                        </a:rPr>
+                        <a:t>, bytes); </a:t>
+                      </a:r>
+                    </a:p>
+                    <a:p>
+                      <a:pPr marL="0" marR="0" indent="0" algn="l" defTabSz="914400" rtl="0" eaLnBrk="1" fontAlgn="auto" latinLnBrk="0" hangingPunct="1">
+                        <a:lnSpc>
+                          <a:spcPct val="100000"/>
+                        </a:lnSpc>
+                        <a:spcBef>
+                          <a:spcPts val="0"/>
+                        </a:spcBef>
+                        <a:spcAft>
+                          <a:spcPts val="0"/>
+                        </a:spcAft>
+                        <a:buClrTx/>
+                        <a:buSzTx/>
+                        <a:buFontTx/>
+                        <a:buNone/>
+                        <a:tabLst/>
+                        <a:defRPr/>
+                      </a:pPr>
+                      <a:r>
+                        <a:rPr lang="en-US" sz="1800" b="1" kern="1200" dirty="0" smtClean="0">
+                          <a:solidFill>
+                            <a:schemeClr val="tx1"/>
+                          </a:solidFill>
+                          <a:effectLst/>
+                          <a:latin typeface="+mn-lt"/>
+                          <a:ea typeface="+mn-ea"/>
+                          <a:cs typeface="+mn-cs"/>
+                        </a:rPr>
+                        <a:t>    </a:t>
+                      </a:r>
+                      <a:r>
+                        <a:rPr lang="en-US" sz="1800" b="1" kern="1200" dirty="0" err="1" smtClean="0">
+                          <a:solidFill>
+                            <a:schemeClr val="tx1"/>
+                          </a:solidFill>
+                          <a:effectLst/>
+                          <a:latin typeface="+mn-lt"/>
+                          <a:ea typeface="+mn-ea"/>
+                          <a:cs typeface="+mn-cs"/>
+                        </a:rPr>
+                        <a:t>cudaMalloc</a:t>
+                      </a:r>
+                      <a:r>
+                        <a:rPr lang="en-US" sz="1800" b="1" kern="1200" dirty="0" smtClean="0">
+                          <a:solidFill>
+                            <a:schemeClr val="tx1"/>
+                          </a:solidFill>
+                          <a:effectLst/>
+                          <a:latin typeface="+mn-lt"/>
+                          <a:ea typeface="+mn-ea"/>
+                          <a:cs typeface="+mn-cs"/>
+                        </a:rPr>
+                        <a:t>(&amp;</a:t>
+                      </a:r>
+                      <a:r>
+                        <a:rPr lang="en-US" sz="1800" b="1" kern="1200" dirty="0" err="1" smtClean="0">
+                          <a:solidFill>
+                            <a:schemeClr val="tx1"/>
+                          </a:solidFill>
+                          <a:effectLst/>
+                          <a:latin typeface="+mn-lt"/>
+                          <a:ea typeface="+mn-ea"/>
+                          <a:cs typeface="+mn-cs"/>
+                        </a:rPr>
+                        <a:t>d_b</a:t>
+                      </a:r>
+                      <a:r>
+                        <a:rPr lang="en-US" sz="1800" b="1" kern="1200" dirty="0" smtClean="0">
+                          <a:solidFill>
+                            <a:schemeClr val="tx1"/>
+                          </a:solidFill>
+                          <a:effectLst/>
+                          <a:latin typeface="+mn-lt"/>
+                          <a:ea typeface="+mn-ea"/>
+                          <a:cs typeface="+mn-cs"/>
+                        </a:rPr>
+                        <a:t>, bytes); </a:t>
+                      </a:r>
+                    </a:p>
+                    <a:p>
+                      <a:pPr marL="0" marR="0" indent="0" algn="l" defTabSz="914400" rtl="0" eaLnBrk="1" fontAlgn="auto" latinLnBrk="0" hangingPunct="1">
+                        <a:lnSpc>
+                          <a:spcPct val="100000"/>
+                        </a:lnSpc>
+                        <a:spcBef>
+                          <a:spcPts val="0"/>
+                        </a:spcBef>
+                        <a:spcAft>
+                          <a:spcPts val="0"/>
+                        </a:spcAft>
+                        <a:buClrTx/>
+                        <a:buSzTx/>
+                        <a:buFontTx/>
+                        <a:buNone/>
+                        <a:tabLst/>
+                        <a:defRPr/>
+                      </a:pPr>
+                      <a:r>
+                        <a:rPr lang="en-US" sz="1800" b="1" kern="1200" dirty="0" smtClean="0">
+                          <a:solidFill>
+                            <a:schemeClr val="tx1"/>
+                          </a:solidFill>
+                          <a:effectLst/>
+                          <a:latin typeface="+mn-lt"/>
+                          <a:ea typeface="+mn-ea"/>
+                          <a:cs typeface="+mn-cs"/>
+                        </a:rPr>
+                        <a:t>    // Bind to texture memory</a:t>
+                      </a:r>
+                    </a:p>
+                    <a:p>
+                      <a:pPr marL="0" marR="0" indent="0" algn="l" defTabSz="914400" rtl="0" eaLnBrk="1" fontAlgn="auto" latinLnBrk="0" hangingPunct="1">
+                        <a:lnSpc>
+                          <a:spcPct val="100000"/>
+                        </a:lnSpc>
+                        <a:spcBef>
+                          <a:spcPts val="0"/>
+                        </a:spcBef>
+                        <a:spcAft>
+                          <a:spcPts val="0"/>
+                        </a:spcAft>
+                        <a:buClrTx/>
+                        <a:buSzTx/>
+                        <a:buFontTx/>
+                        <a:buNone/>
+                        <a:tabLst/>
+                        <a:defRPr/>
+                      </a:pPr>
+                      <a:r>
+                        <a:rPr lang="en-US" sz="1800" b="1" kern="1200" baseline="0" dirty="0" smtClean="0">
+                          <a:solidFill>
+                            <a:schemeClr val="tx1"/>
+                          </a:solidFill>
+                          <a:effectLst/>
+                          <a:latin typeface="+mn-lt"/>
+                          <a:ea typeface="+mn-ea"/>
+                          <a:cs typeface="+mn-cs"/>
+                        </a:rPr>
+                        <a:t>    </a:t>
+                      </a:r>
+                      <a:r>
+                        <a:rPr lang="en-US" sz="1800" b="1" kern="1200" dirty="0" err="1" smtClean="0">
+                          <a:solidFill>
+                            <a:schemeClr val="tx1"/>
+                          </a:solidFill>
+                          <a:effectLst/>
+                          <a:latin typeface="+mn-lt"/>
+                          <a:ea typeface="+mn-ea"/>
+                          <a:cs typeface="+mn-cs"/>
+                        </a:rPr>
+                        <a:t>cudaBindTexture</a:t>
+                      </a:r>
+                      <a:r>
+                        <a:rPr lang="en-US" sz="1800" b="1" kern="1200" dirty="0" smtClean="0">
+                          <a:solidFill>
+                            <a:schemeClr val="tx1"/>
+                          </a:solidFill>
+                          <a:effectLst/>
+                          <a:latin typeface="+mn-lt"/>
+                          <a:ea typeface="+mn-ea"/>
+                          <a:cs typeface="+mn-cs"/>
+                        </a:rPr>
+                        <a:t>( NULL, </a:t>
+                      </a:r>
+                      <a:r>
+                        <a:rPr lang="en-US" sz="1800" b="1" kern="1200" dirty="0" err="1" smtClean="0">
+                          <a:solidFill>
+                            <a:schemeClr val="tx1"/>
+                          </a:solidFill>
+                          <a:effectLst/>
+                          <a:latin typeface="+mn-lt"/>
+                          <a:ea typeface="+mn-ea"/>
+                          <a:cs typeface="+mn-cs"/>
+                        </a:rPr>
+                        <a:t>tex_a</a:t>
+                      </a:r>
+                      <a:r>
+                        <a:rPr lang="en-US" sz="1800" b="1" kern="1200" dirty="0" smtClean="0">
+                          <a:solidFill>
+                            <a:schemeClr val="tx1"/>
+                          </a:solidFill>
+                          <a:effectLst/>
+                          <a:latin typeface="+mn-lt"/>
+                          <a:ea typeface="+mn-ea"/>
+                          <a:cs typeface="+mn-cs"/>
+                        </a:rPr>
+                        <a:t>,</a:t>
+                      </a:r>
+                      <a:r>
+                        <a:rPr lang="en-US" sz="1800" b="1" kern="1200" baseline="0" dirty="0" smtClean="0">
+                          <a:solidFill>
+                            <a:schemeClr val="tx1"/>
+                          </a:solidFill>
+                          <a:effectLst/>
+                          <a:latin typeface="+mn-lt"/>
+                          <a:ea typeface="+mn-ea"/>
+                          <a:cs typeface="+mn-cs"/>
+                        </a:rPr>
+                        <a:t> </a:t>
+                      </a:r>
+                      <a:r>
+                        <a:rPr lang="en-US" sz="1800" b="1" kern="1200" dirty="0" err="1" smtClean="0">
+                          <a:solidFill>
+                            <a:schemeClr val="tx1"/>
+                          </a:solidFill>
+                          <a:effectLst/>
+                          <a:latin typeface="+mn-lt"/>
+                          <a:ea typeface="+mn-ea"/>
+                          <a:cs typeface="+mn-cs"/>
+                        </a:rPr>
+                        <a:t>d_a</a:t>
+                      </a:r>
+                      <a:r>
+                        <a:rPr lang="en-US" sz="1800" b="1" kern="1200" dirty="0" smtClean="0">
+                          <a:solidFill>
+                            <a:schemeClr val="tx1"/>
+                          </a:solidFill>
+                          <a:effectLst/>
+                          <a:latin typeface="+mn-lt"/>
+                          <a:ea typeface="+mn-ea"/>
+                          <a:cs typeface="+mn-cs"/>
+                        </a:rPr>
+                        <a:t>,	bytes );	</a:t>
+                      </a:r>
+                    </a:p>
+                    <a:p>
+                      <a:pPr marL="0" marR="0" indent="0" algn="l" defTabSz="914400" rtl="0" eaLnBrk="1" fontAlgn="auto" latinLnBrk="0" hangingPunct="1">
+                        <a:lnSpc>
+                          <a:spcPct val="100000"/>
+                        </a:lnSpc>
+                        <a:spcBef>
+                          <a:spcPts val="0"/>
+                        </a:spcBef>
+                        <a:spcAft>
+                          <a:spcPts val="0"/>
+                        </a:spcAft>
+                        <a:buClrTx/>
+                        <a:buSzTx/>
+                        <a:buFontTx/>
+                        <a:buNone/>
+                        <a:tabLst/>
+                        <a:defRPr/>
+                      </a:pPr>
+                      <a:r>
+                        <a:rPr lang="en-US" sz="1800" b="1" kern="1200" dirty="0" smtClean="0">
+                          <a:solidFill>
+                            <a:schemeClr val="tx1"/>
+                          </a:solidFill>
+                          <a:effectLst/>
+                          <a:latin typeface="+mn-lt"/>
+                          <a:ea typeface="+mn-ea"/>
+                          <a:cs typeface="+mn-cs"/>
+                        </a:rPr>
+                        <a:t>    </a:t>
+                      </a:r>
+                      <a:r>
+                        <a:rPr lang="en-US" sz="1800" b="1" kern="1200" dirty="0" err="1" smtClean="0">
+                          <a:solidFill>
+                            <a:schemeClr val="tx1"/>
+                          </a:solidFill>
+                          <a:effectLst/>
+                          <a:latin typeface="+mn-lt"/>
+                          <a:ea typeface="+mn-ea"/>
+                          <a:cs typeface="+mn-cs"/>
+                        </a:rPr>
+                        <a:t>cudaBindTexture</a:t>
+                      </a:r>
+                      <a:r>
+                        <a:rPr lang="en-US" sz="1800" b="1" kern="1200" dirty="0" smtClean="0">
+                          <a:solidFill>
+                            <a:schemeClr val="tx1"/>
+                          </a:solidFill>
+                          <a:effectLst/>
+                          <a:latin typeface="+mn-lt"/>
+                          <a:ea typeface="+mn-ea"/>
+                          <a:cs typeface="+mn-cs"/>
+                        </a:rPr>
+                        <a:t>( NULL, </a:t>
+                      </a:r>
+                      <a:r>
+                        <a:rPr lang="en-US" sz="1800" b="1" kern="1200" dirty="0" err="1" smtClean="0">
+                          <a:solidFill>
+                            <a:schemeClr val="tx1"/>
+                          </a:solidFill>
+                          <a:effectLst/>
+                          <a:latin typeface="+mn-lt"/>
+                          <a:ea typeface="+mn-ea"/>
+                          <a:cs typeface="+mn-cs"/>
+                        </a:rPr>
+                        <a:t>tex_b</a:t>
+                      </a:r>
+                      <a:r>
+                        <a:rPr lang="en-US" sz="1800" b="1" kern="1200" dirty="0" smtClean="0">
+                          <a:solidFill>
+                            <a:schemeClr val="tx1"/>
+                          </a:solidFill>
+                          <a:effectLst/>
+                          <a:latin typeface="+mn-lt"/>
+                          <a:ea typeface="+mn-ea"/>
+                          <a:cs typeface="+mn-cs"/>
+                        </a:rPr>
+                        <a:t>,</a:t>
+                      </a:r>
+                      <a:r>
+                        <a:rPr lang="en-US" sz="1800" b="1" kern="1200" baseline="0" dirty="0" smtClean="0">
+                          <a:solidFill>
+                            <a:schemeClr val="tx1"/>
+                          </a:solidFill>
+                          <a:effectLst/>
+                          <a:latin typeface="+mn-lt"/>
+                          <a:ea typeface="+mn-ea"/>
+                          <a:cs typeface="+mn-cs"/>
+                        </a:rPr>
+                        <a:t> </a:t>
+                      </a:r>
+                      <a:r>
+                        <a:rPr lang="en-US" sz="1800" b="1" kern="1200" dirty="0" smtClean="0">
+                          <a:solidFill>
+                            <a:schemeClr val="tx1"/>
+                          </a:solidFill>
+                          <a:effectLst/>
+                          <a:latin typeface="+mn-lt"/>
+                          <a:ea typeface="+mn-ea"/>
+                          <a:cs typeface="+mn-cs"/>
+                        </a:rPr>
+                        <a:t> </a:t>
+                      </a:r>
+                      <a:r>
+                        <a:rPr lang="en-US" sz="1800" b="1" kern="1200" dirty="0" err="1" smtClean="0">
+                          <a:solidFill>
+                            <a:schemeClr val="tx1"/>
+                          </a:solidFill>
+                          <a:effectLst/>
+                          <a:latin typeface="+mn-lt"/>
+                          <a:ea typeface="+mn-ea"/>
+                          <a:cs typeface="+mn-cs"/>
+                        </a:rPr>
+                        <a:t>d_b</a:t>
+                      </a:r>
+                      <a:r>
+                        <a:rPr lang="en-US" sz="1800" b="1" kern="1200" dirty="0" smtClean="0">
+                          <a:solidFill>
+                            <a:schemeClr val="tx1"/>
+                          </a:solidFill>
+                          <a:effectLst/>
+                          <a:latin typeface="+mn-lt"/>
+                          <a:ea typeface="+mn-ea"/>
+                          <a:cs typeface="+mn-cs"/>
+                        </a:rPr>
+                        <a:t>,	bytes );	</a:t>
+                      </a:r>
+                    </a:p>
+                    <a:p>
+                      <a:pPr marL="0" marR="0" indent="0" algn="l" defTabSz="914400" rtl="0" eaLnBrk="1" fontAlgn="auto" latinLnBrk="0" hangingPunct="1">
+                        <a:lnSpc>
+                          <a:spcPct val="100000"/>
+                        </a:lnSpc>
+                        <a:spcBef>
+                          <a:spcPts val="0"/>
+                        </a:spcBef>
+                        <a:spcAft>
+                          <a:spcPts val="0"/>
+                        </a:spcAft>
+                        <a:buClrTx/>
+                        <a:buSzTx/>
+                        <a:buFontTx/>
+                        <a:buNone/>
+                        <a:tabLst/>
+                        <a:defRPr/>
+                      </a:pPr>
+                      <a:r>
+                        <a:rPr lang="en-US" sz="1800" b="1" kern="1200" dirty="0" smtClean="0">
+                          <a:solidFill>
+                            <a:schemeClr val="tx1"/>
+                          </a:solidFill>
+                          <a:effectLst/>
+                          <a:latin typeface="+mn-lt"/>
+                          <a:ea typeface="+mn-ea"/>
+                          <a:cs typeface="+mn-cs"/>
+                        </a:rPr>
+                        <a:t>    // Copy host vectors to device    </a:t>
+                      </a:r>
+                    </a:p>
+                    <a:p>
+                      <a:pPr marL="0" marR="0" indent="0" algn="l" defTabSz="914400" rtl="0" eaLnBrk="1" fontAlgn="auto" latinLnBrk="0" hangingPunct="1">
+                        <a:lnSpc>
+                          <a:spcPct val="100000"/>
+                        </a:lnSpc>
+                        <a:spcBef>
+                          <a:spcPts val="0"/>
+                        </a:spcBef>
+                        <a:spcAft>
+                          <a:spcPts val="0"/>
+                        </a:spcAft>
+                        <a:buClrTx/>
+                        <a:buSzTx/>
+                        <a:buFontTx/>
+                        <a:buNone/>
+                        <a:tabLst/>
+                        <a:defRPr/>
+                      </a:pPr>
+                      <a:r>
+                        <a:rPr lang="en-US" sz="1800" b="1" kern="1200" dirty="0" smtClean="0">
+                          <a:solidFill>
+                            <a:schemeClr val="tx1"/>
+                          </a:solidFill>
+                          <a:effectLst/>
+                          <a:latin typeface="+mn-lt"/>
+                          <a:ea typeface="+mn-ea"/>
+                          <a:cs typeface="+mn-cs"/>
+                        </a:rPr>
+                        <a:t>    </a:t>
+                      </a:r>
+                      <a:r>
+                        <a:rPr lang="en-US" sz="1800" b="1" kern="1200" dirty="0" err="1" smtClean="0">
+                          <a:solidFill>
+                            <a:schemeClr val="tx1"/>
+                          </a:solidFill>
+                          <a:effectLst/>
+                          <a:latin typeface="+mn-lt"/>
+                          <a:ea typeface="+mn-ea"/>
+                          <a:cs typeface="+mn-cs"/>
+                        </a:rPr>
+                        <a:t>cudaMemcpy</a:t>
+                      </a:r>
+                      <a:r>
+                        <a:rPr lang="en-US" sz="1800" b="1" kern="1200" dirty="0" smtClean="0">
+                          <a:solidFill>
+                            <a:schemeClr val="tx1"/>
+                          </a:solidFill>
+                          <a:effectLst/>
+                          <a:latin typeface="+mn-lt"/>
+                          <a:ea typeface="+mn-ea"/>
+                          <a:cs typeface="+mn-cs"/>
+                        </a:rPr>
+                        <a:t>( </a:t>
+                      </a:r>
+                      <a:r>
+                        <a:rPr lang="en-US" sz="1800" b="1" kern="1200" dirty="0" err="1" smtClean="0">
+                          <a:solidFill>
+                            <a:schemeClr val="tx1"/>
+                          </a:solidFill>
+                          <a:effectLst/>
+                          <a:latin typeface="+mn-lt"/>
+                          <a:ea typeface="+mn-ea"/>
+                          <a:cs typeface="+mn-cs"/>
+                        </a:rPr>
+                        <a:t>d_a</a:t>
+                      </a:r>
+                      <a:r>
+                        <a:rPr lang="en-US" sz="1800" b="1" kern="1200" dirty="0" smtClean="0">
+                          <a:solidFill>
+                            <a:schemeClr val="tx1"/>
+                          </a:solidFill>
+                          <a:effectLst/>
+                          <a:latin typeface="+mn-lt"/>
+                          <a:ea typeface="+mn-ea"/>
+                          <a:cs typeface="+mn-cs"/>
+                        </a:rPr>
+                        <a:t>, </a:t>
+                      </a:r>
+                      <a:r>
+                        <a:rPr lang="en-US" sz="1800" b="1" kern="1200" dirty="0" err="1" smtClean="0">
+                          <a:solidFill>
+                            <a:schemeClr val="tx1"/>
+                          </a:solidFill>
+                          <a:effectLst/>
+                          <a:latin typeface="+mn-lt"/>
+                          <a:ea typeface="+mn-ea"/>
+                          <a:cs typeface="+mn-cs"/>
+                        </a:rPr>
+                        <a:t>h_a</a:t>
+                      </a:r>
+                      <a:r>
+                        <a:rPr lang="en-US" sz="1800" b="1" kern="1200" dirty="0" smtClean="0">
+                          <a:solidFill>
+                            <a:schemeClr val="tx1"/>
+                          </a:solidFill>
+                          <a:effectLst/>
+                          <a:latin typeface="+mn-lt"/>
+                          <a:ea typeface="+mn-ea"/>
+                          <a:cs typeface="+mn-cs"/>
+                        </a:rPr>
+                        <a:t>, bytes, </a:t>
+                      </a:r>
+                      <a:r>
+                        <a:rPr lang="en-US" sz="1800" b="1" kern="1200" dirty="0" err="1" smtClean="0">
+                          <a:solidFill>
+                            <a:schemeClr val="tx1"/>
+                          </a:solidFill>
+                          <a:effectLst/>
+                          <a:latin typeface="+mn-lt"/>
+                          <a:ea typeface="+mn-ea"/>
+                          <a:cs typeface="+mn-cs"/>
+                        </a:rPr>
+                        <a:t>cudaMemcpyHostToDevice</a:t>
+                      </a:r>
+                      <a:r>
+                        <a:rPr lang="en-US" sz="1800" b="1" kern="1200" dirty="0" smtClean="0">
+                          <a:solidFill>
+                            <a:schemeClr val="tx1"/>
+                          </a:solidFill>
+                          <a:effectLst/>
+                          <a:latin typeface="+mn-lt"/>
+                          <a:ea typeface="+mn-ea"/>
+                          <a:cs typeface="+mn-cs"/>
+                        </a:rPr>
+                        <a:t>);    </a:t>
+                      </a:r>
+                    </a:p>
+                    <a:p>
+                      <a:pPr marL="0" marR="0" indent="0" algn="l" defTabSz="914400" rtl="0" eaLnBrk="1" fontAlgn="auto" latinLnBrk="0" hangingPunct="1">
+                        <a:lnSpc>
+                          <a:spcPct val="100000"/>
+                        </a:lnSpc>
+                        <a:spcBef>
+                          <a:spcPts val="0"/>
+                        </a:spcBef>
+                        <a:spcAft>
+                          <a:spcPts val="0"/>
+                        </a:spcAft>
+                        <a:buClrTx/>
+                        <a:buSzTx/>
+                        <a:buFontTx/>
+                        <a:buNone/>
+                        <a:tabLst/>
+                        <a:defRPr/>
+                      </a:pPr>
+                      <a:r>
+                        <a:rPr lang="en-US" sz="1800" b="1" kern="1200" dirty="0" smtClean="0">
+                          <a:solidFill>
+                            <a:schemeClr val="tx1"/>
+                          </a:solidFill>
+                          <a:effectLst/>
+                          <a:latin typeface="+mn-lt"/>
+                          <a:ea typeface="+mn-ea"/>
+                          <a:cs typeface="+mn-cs"/>
+                        </a:rPr>
+                        <a:t>    </a:t>
+                      </a:r>
+                      <a:r>
+                        <a:rPr lang="en-US" sz="1800" b="1" kern="1200" dirty="0" err="1" smtClean="0">
+                          <a:solidFill>
+                            <a:schemeClr val="tx1"/>
+                          </a:solidFill>
+                          <a:effectLst/>
+                          <a:latin typeface="+mn-lt"/>
+                          <a:ea typeface="+mn-ea"/>
+                          <a:cs typeface="+mn-cs"/>
+                        </a:rPr>
+                        <a:t>cudaMemcpy</a:t>
+                      </a:r>
+                      <a:r>
+                        <a:rPr lang="en-US" sz="1800" b="1" kern="1200" dirty="0" smtClean="0">
+                          <a:solidFill>
+                            <a:schemeClr val="tx1"/>
+                          </a:solidFill>
+                          <a:effectLst/>
+                          <a:latin typeface="+mn-lt"/>
+                          <a:ea typeface="+mn-ea"/>
+                          <a:cs typeface="+mn-cs"/>
+                        </a:rPr>
+                        <a:t>( </a:t>
+                      </a:r>
+                      <a:r>
+                        <a:rPr lang="en-US" sz="1800" b="1" kern="1200" dirty="0" err="1" smtClean="0">
+                          <a:solidFill>
+                            <a:schemeClr val="tx1"/>
+                          </a:solidFill>
+                          <a:effectLst/>
+                          <a:latin typeface="+mn-lt"/>
+                          <a:ea typeface="+mn-ea"/>
+                          <a:cs typeface="+mn-cs"/>
+                        </a:rPr>
+                        <a:t>d_b</a:t>
+                      </a:r>
+                      <a:r>
+                        <a:rPr lang="en-US" sz="1800" b="1" kern="1200" dirty="0" smtClean="0">
+                          <a:solidFill>
+                            <a:schemeClr val="tx1"/>
+                          </a:solidFill>
+                          <a:effectLst/>
+                          <a:latin typeface="+mn-lt"/>
+                          <a:ea typeface="+mn-ea"/>
+                          <a:cs typeface="+mn-cs"/>
+                        </a:rPr>
+                        <a:t>, </a:t>
+                      </a:r>
+                      <a:r>
+                        <a:rPr lang="en-US" sz="1800" b="1" kern="1200" dirty="0" err="1" smtClean="0">
+                          <a:solidFill>
+                            <a:schemeClr val="tx1"/>
+                          </a:solidFill>
+                          <a:effectLst/>
+                          <a:latin typeface="+mn-lt"/>
+                          <a:ea typeface="+mn-ea"/>
+                          <a:cs typeface="+mn-cs"/>
+                        </a:rPr>
+                        <a:t>h_b</a:t>
+                      </a:r>
+                      <a:r>
+                        <a:rPr lang="en-US" sz="1800" b="1" kern="1200" dirty="0" smtClean="0">
+                          <a:solidFill>
+                            <a:schemeClr val="tx1"/>
+                          </a:solidFill>
+                          <a:effectLst/>
+                          <a:latin typeface="+mn-lt"/>
+                          <a:ea typeface="+mn-ea"/>
+                          <a:cs typeface="+mn-cs"/>
+                        </a:rPr>
+                        <a:t>, bytes, </a:t>
+                      </a:r>
+                      <a:r>
+                        <a:rPr lang="en-US" sz="1800" b="1" kern="1200" dirty="0" err="1" smtClean="0">
+                          <a:solidFill>
+                            <a:schemeClr val="tx1"/>
+                          </a:solidFill>
+                          <a:effectLst/>
+                          <a:latin typeface="+mn-lt"/>
+                          <a:ea typeface="+mn-ea"/>
+                          <a:cs typeface="+mn-cs"/>
+                        </a:rPr>
+                        <a:t>cudaMemcpyHostToDevice</a:t>
+                      </a:r>
+                      <a:r>
+                        <a:rPr lang="en-US" sz="1800" b="1" kern="1200" dirty="0" smtClean="0">
+                          <a:solidFill>
+                            <a:schemeClr val="tx1"/>
+                          </a:solidFill>
+                          <a:effectLst/>
+                          <a:latin typeface="+mn-lt"/>
+                          <a:ea typeface="+mn-ea"/>
+                          <a:cs typeface="+mn-cs"/>
+                        </a:rPr>
+                        <a:t>);</a:t>
+                      </a:r>
+                    </a:p>
+                    <a:p>
+                      <a:pPr marL="0" marR="0" indent="0" algn="l" defTabSz="914400" rtl="0" eaLnBrk="1" fontAlgn="auto" latinLnBrk="0" hangingPunct="1">
+                        <a:lnSpc>
+                          <a:spcPct val="100000"/>
+                        </a:lnSpc>
+                        <a:spcBef>
+                          <a:spcPts val="0"/>
+                        </a:spcBef>
+                        <a:spcAft>
+                          <a:spcPts val="0"/>
+                        </a:spcAft>
+                        <a:buClrTx/>
+                        <a:buSzTx/>
+                        <a:buFontTx/>
+                        <a:buNone/>
+                        <a:tabLst/>
+                        <a:defRPr/>
+                      </a:pPr>
+                      <a:r>
+                        <a:rPr lang="en-US" sz="1800" b="1" kern="1200" dirty="0" smtClean="0">
+                          <a:solidFill>
+                            <a:schemeClr val="tx1"/>
+                          </a:solidFill>
+                          <a:effectLst/>
+                          <a:latin typeface="+mn-lt"/>
+                          <a:ea typeface="+mn-ea"/>
+                          <a:cs typeface="+mn-cs"/>
+                        </a:rPr>
+                        <a:t>    //Execution</a:t>
+                      </a:r>
+                    </a:p>
+                    <a:p>
+                      <a:pPr marL="0" marR="0" indent="0" algn="l" defTabSz="914400" rtl="0" eaLnBrk="1" fontAlgn="auto" latinLnBrk="0" hangingPunct="1">
+                        <a:lnSpc>
+                          <a:spcPct val="100000"/>
+                        </a:lnSpc>
+                        <a:spcBef>
+                          <a:spcPts val="0"/>
+                        </a:spcBef>
+                        <a:spcAft>
+                          <a:spcPts val="0"/>
+                        </a:spcAft>
+                        <a:buClrTx/>
+                        <a:buSzTx/>
+                        <a:buFontTx/>
+                        <a:buNone/>
+                        <a:tabLst/>
+                        <a:defRPr/>
+                      </a:pPr>
+                      <a:r>
+                        <a:rPr lang="en-US" sz="1800" b="1" kern="1200" dirty="0" smtClean="0">
+                          <a:solidFill>
+                            <a:schemeClr val="tx1"/>
+                          </a:solidFill>
+                          <a:effectLst/>
+                          <a:latin typeface="+mn-lt"/>
+                          <a:ea typeface="+mn-ea"/>
+                          <a:cs typeface="+mn-cs"/>
+                        </a:rPr>
+                        <a:t>    </a:t>
+                      </a:r>
+                      <a:r>
+                        <a:rPr lang="en-US" sz="1800" b="1" kern="1200" dirty="0" err="1" smtClean="0">
+                          <a:solidFill>
+                            <a:schemeClr val="tx1"/>
+                          </a:solidFill>
+                          <a:effectLst/>
+                          <a:latin typeface="+mn-lt"/>
+                          <a:ea typeface="+mn-ea"/>
+                          <a:cs typeface="+mn-cs"/>
+                        </a:rPr>
+                        <a:t>vecAdd</a:t>
+                      </a:r>
+                      <a:r>
+                        <a:rPr lang="en-US" sz="1800" b="1" kern="1200" dirty="0" smtClean="0">
+                          <a:solidFill>
+                            <a:schemeClr val="tx1"/>
+                          </a:solidFill>
+                          <a:effectLst/>
+                          <a:latin typeface="+mn-lt"/>
+                          <a:ea typeface="+mn-ea"/>
+                          <a:cs typeface="+mn-cs"/>
+                        </a:rPr>
+                        <a:t>&lt;&lt;&lt;</a:t>
+                      </a:r>
+                      <a:r>
+                        <a:rPr lang="en-US" sz="1800" b="1" kern="1200" dirty="0" err="1" smtClean="0">
+                          <a:solidFill>
+                            <a:schemeClr val="tx1"/>
+                          </a:solidFill>
+                          <a:effectLst/>
+                          <a:latin typeface="+mn-lt"/>
+                          <a:ea typeface="+mn-ea"/>
+                          <a:cs typeface="+mn-cs"/>
+                        </a:rPr>
+                        <a:t>gridSize</a:t>
+                      </a:r>
+                      <a:r>
+                        <a:rPr lang="en-US" sz="1800" b="1" kern="1200" dirty="0" smtClean="0">
+                          <a:solidFill>
+                            <a:schemeClr val="tx1"/>
+                          </a:solidFill>
+                          <a:effectLst/>
+                          <a:latin typeface="+mn-lt"/>
+                          <a:ea typeface="+mn-ea"/>
+                          <a:cs typeface="+mn-cs"/>
+                        </a:rPr>
+                        <a:t>, </a:t>
+                      </a:r>
+                      <a:r>
+                        <a:rPr lang="en-US" sz="1800" b="1" kern="1200" dirty="0" err="1" smtClean="0">
+                          <a:solidFill>
+                            <a:schemeClr val="tx1"/>
+                          </a:solidFill>
+                          <a:effectLst/>
+                          <a:latin typeface="+mn-lt"/>
+                          <a:ea typeface="+mn-ea"/>
+                          <a:cs typeface="+mn-cs"/>
+                        </a:rPr>
+                        <a:t>blockSize</a:t>
+                      </a:r>
+                      <a:r>
+                        <a:rPr lang="en-US" sz="1800" b="1" kern="1200" dirty="0" smtClean="0">
+                          <a:solidFill>
+                            <a:schemeClr val="tx1"/>
+                          </a:solidFill>
+                          <a:effectLst/>
+                          <a:latin typeface="+mn-lt"/>
+                          <a:ea typeface="+mn-ea"/>
+                          <a:cs typeface="+mn-cs"/>
+                        </a:rPr>
+                        <a:t>&gt;&gt;&gt;(</a:t>
+                      </a:r>
+                      <a:r>
+                        <a:rPr lang="en-US" sz="1800" b="1" kern="1200" dirty="0" err="1" smtClean="0">
+                          <a:solidFill>
+                            <a:schemeClr val="tx1"/>
+                          </a:solidFill>
+                          <a:effectLst/>
+                          <a:latin typeface="+mn-lt"/>
+                          <a:ea typeface="+mn-ea"/>
+                          <a:cs typeface="+mn-cs"/>
+                        </a:rPr>
+                        <a:t>d_c</a:t>
+                      </a:r>
+                      <a:r>
+                        <a:rPr lang="en-US" sz="1800" b="1" kern="1200" dirty="0" smtClean="0">
+                          <a:solidFill>
+                            <a:schemeClr val="tx1"/>
+                          </a:solidFill>
+                          <a:effectLst/>
+                          <a:latin typeface="+mn-lt"/>
+                          <a:ea typeface="+mn-ea"/>
+                          <a:cs typeface="+mn-cs"/>
+                        </a:rPr>
+                        <a:t>);</a:t>
+                      </a:r>
                     </a:p>
                     <a:p>
                       <a:pPr marL="0" marR="0" indent="0" algn="l" defTabSz="914400" rtl="0" eaLnBrk="1" fontAlgn="auto" latinLnBrk="0" hangingPunct="1">
@@ -4214,7 +5754,7 @@
                   </a:tcPr>
                 </a:tc>
               </a:tr>
-              <a:tr h="370840">
+              <a:tr h="1735191">
                 <a:tc>
                   <a:txBody>
                     <a:bodyPr/>
@@ -4320,14 +5860,39 @@
                     </a:p>
                     <a:p>
                       <a:pPr marL="0" algn="l" defTabSz="914400" rtl="0" eaLnBrk="1" latinLnBrk="0" hangingPunct="1"/>
-                      <a:endParaRPr lang="fi-FI" sz="1800" b="1" kern="1200" dirty="0" smtClean="0">
-                        <a:solidFill>
-                          <a:schemeClr val="tx1"/>
-                        </a:solidFill>
-                        <a:latin typeface="+mn-lt"/>
-                        <a:ea typeface="+mn-ea"/>
-                        <a:cs typeface="+mn-cs"/>
-                      </a:endParaRPr>
+                      <a:r>
+                        <a:rPr lang="fi-FI" sz="1800" b="1" kern="1200" dirty="0" smtClean="0">
+                          <a:solidFill>
+                            <a:schemeClr val="tx1"/>
+                          </a:solidFill>
+                          <a:latin typeface="+mn-lt"/>
+                          <a:ea typeface="+mn-ea"/>
+                          <a:cs typeface="+mn-cs"/>
+                        </a:rPr>
+                        <a:t>//Data </a:t>
+                      </a:r>
+                      <a:r>
+                        <a:rPr lang="fi-FI" sz="1800" b="1" kern="1200" dirty="0" err="1" smtClean="0">
+                          <a:solidFill>
+                            <a:schemeClr val="tx1"/>
+                          </a:solidFill>
+                          <a:latin typeface="+mn-lt"/>
+                          <a:ea typeface="+mn-ea"/>
+                          <a:cs typeface="+mn-cs"/>
+                        </a:rPr>
+                        <a:t>object</a:t>
+                      </a:r>
+                      <a:r>
+                        <a:rPr lang="fi-FI" sz="1800" b="1" kern="1200" dirty="0" smtClean="0">
+                          <a:solidFill>
+                            <a:schemeClr val="tx1"/>
+                          </a:solidFill>
+                          <a:latin typeface="+mn-lt"/>
+                          <a:ea typeface="+mn-ea"/>
+                          <a:cs typeface="+mn-cs"/>
+                        </a:rPr>
+                        <a:t> 1</a:t>
+                      </a:r>
                     </a:p>
                     <a:p>
                       <a:pPr marL="0" algn="l" defTabSz="914400" rtl="0" eaLnBrk="1" latinLnBrk="0" hangingPunct="1"/>
@@ -4340,55 +5905,8 @@
                           <a:ea typeface="+mn-ea"/>
                           <a:cs typeface="+mn-cs"/>
                         </a:rPr>
-                        <a:t>//Data </a:t>
-                      </a:r>
-                      <a:r>
-                        <a:rPr lang="fi-FI" sz="1800" b="1" kern="1200" dirty="0" err="1" smtClean="0">
-                          <a:solidFill>
-                            <a:schemeClr val="tx1"/>
-                          </a:solidFill>
-                          <a:latin typeface="+mn-lt"/>
-                          <a:ea typeface="+mn-ea"/>
-                          <a:cs typeface="+mn-cs"/>
-                        </a:rPr>
-                        <a:t>object</a:t>
-                      </a:r>
-                      <a:r>
-                        <a:rPr lang="fi-FI" sz="1800" b="1" kern="1200" dirty="0" smtClean="0">
-                          <a:solidFill>
-                            <a:schemeClr val="tx1"/>
-                          </a:solidFill>
-                          <a:latin typeface="+mn-lt"/>
-                          <a:ea typeface="+mn-ea"/>
-                          <a:cs typeface="+mn-cs"/>
-                        </a:rPr>
-                        <a:t> 1</a:t>
-                      </a:r>
-                    </a:p>
-                    <a:p>
-                      <a:pPr marL="0" algn="l" defTabSz="914400" rtl="0" eaLnBrk="1" latinLnBrk="0" hangingPunct="1"/>
-                      <a:r>
-                        <a:rPr lang="fi-FI" sz="1800" b="1" kern="1200" dirty="0" smtClean="0">
-                          <a:solidFill>
-                            <a:schemeClr val="tx1"/>
-                          </a:solidFill>
-                          <a:latin typeface="+mn-lt"/>
-                          <a:ea typeface="+mn-ea"/>
-                          <a:cs typeface="+mn-cs"/>
-                        </a:rPr>
                         <a:t>TLD.LZ.T R2, R0, 0x0, 1D, 0x1; </a:t>
                       </a:r>
-                    </a:p>
-                    <a:p>
-                      <a:pPr marL="0" algn="l" defTabSz="914400" rtl="0" eaLnBrk="1" latinLnBrk="0" hangingPunct="1"/>
-                      <a:endParaRPr lang="fi-FI" sz="1800" b="1" kern="1200" dirty="0" smtClean="0">
-                        <a:solidFill>
-                          <a:schemeClr val="tx1"/>
-                        </a:solidFill>
-                        <a:latin typeface="+mn-lt"/>
-                        <a:ea typeface="+mn-ea"/>
-                        <a:cs typeface="+mn-cs"/>
-                      </a:endParaRPr>
                     </a:p>
                     <a:p>
                       <a:pPr marL="0" algn="l" defTabSz="914400" rtl="0" eaLnBrk="1" latinLnBrk="0" hangingPunct="1"/>
@@ -4533,14 +6051,14 @@
           <p:nvPr>
             <p:extLst>
               <p:ext uri="{D42A27DB-BD31-4B8C-83A1-F6EECF244321}">
-                <p14:modId xmlns:p14="http://schemas.microsoft.com/office/powerpoint/2010/main" val="1362877025"/>
+                <p14:modId xmlns:p14="http://schemas.microsoft.com/office/powerpoint/2010/main" val="1819671978"/>
               </p:ext>
             </p:extLst>
           </p:nvPr>
         </p:nvGraphicFramePr>
         <p:xfrm>
-          <a:off x="2032000" y="719666"/>
-          <a:ext cx="8128000" cy="5120640"/>
+          <a:off x="1993900" y="319616"/>
+          <a:ext cx="8128000" cy="8138160"/>
         </p:xfrm>
         <a:graphic>
           <a:graphicData uri="http://schemas.openxmlformats.org/drawingml/2006/table">
@@ -4959,6 +6477,760 @@
                         </a:rPr>
                         <a:t>[id];</a:t>
                       </a:r>
+                    </a:p>
+                    <a:p>
+                      <a:r>
+                        <a:rPr lang="en-US" dirty="0" smtClean="0">
+                          <a:solidFill>
+                            <a:schemeClr val="tx1"/>
+                          </a:solidFill>
+                        </a:rPr>
+                        <a:t>}</a:t>
+                      </a:r>
+                    </a:p>
+                    <a:p>
+                      <a:r>
+                        <a:rPr lang="en-US" dirty="0" smtClean="0">
+                          <a:solidFill>
+                            <a:schemeClr val="tx1"/>
+                          </a:solidFill>
+                        </a:rPr>
+                        <a:t>main() {</a:t>
+                      </a:r>
+                    </a:p>
+                    <a:p>
+                      <a:r>
+                        <a:rPr lang="en-US" baseline="0" dirty="0" smtClean="0">
+                          <a:solidFill>
+                            <a:schemeClr val="tx1"/>
+                          </a:solidFill>
+                        </a:rPr>
+                        <a:t>    </a:t>
+                      </a:r>
+                      <a:r>
+                        <a:rPr lang="en-US" dirty="0" smtClean="0">
+                          <a:solidFill>
+                            <a:schemeClr val="tx1"/>
+                          </a:solidFill>
+                        </a:rPr>
+                        <a:t>// Allocate memory for each vector on GPU    </a:t>
+                      </a:r>
+                    </a:p>
+                    <a:p>
+                      <a:r>
+                        <a:rPr lang="en-US" dirty="0" smtClean="0">
+                          <a:solidFill>
+                            <a:schemeClr val="tx1"/>
+                          </a:solidFill>
+                        </a:rPr>
+                        <a:t>    </a:t>
+                      </a:r>
+                      <a:r>
+                        <a:rPr lang="en-US" dirty="0" err="1" smtClean="0">
+                          <a:solidFill>
+                            <a:schemeClr val="tx1"/>
+                          </a:solidFill>
+                        </a:rPr>
+                        <a:t>cudaMalloc</a:t>
+                      </a:r>
+                      <a:r>
+                        <a:rPr lang="en-US" dirty="0" smtClean="0">
+                          <a:solidFill>
+                            <a:schemeClr val="tx1"/>
+                          </a:solidFill>
+                        </a:rPr>
+                        <a:t>(&amp;</a:t>
+                      </a:r>
+                      <a:r>
+                        <a:rPr lang="en-US" dirty="0" err="1" smtClean="0">
+                          <a:solidFill>
+                            <a:schemeClr val="tx1"/>
+                          </a:solidFill>
+                        </a:rPr>
+                        <a:t>d_a</a:t>
+                      </a:r>
+                      <a:r>
+                        <a:rPr lang="en-US" dirty="0" smtClean="0">
+                          <a:solidFill>
+                            <a:schemeClr val="tx1"/>
+                          </a:solidFill>
+                        </a:rPr>
+                        <a:t>, bytes);    </a:t>
+                      </a:r>
+                    </a:p>
+                    <a:p>
+                      <a:r>
+                        <a:rPr lang="en-US" dirty="0" smtClean="0">
+                          <a:solidFill>
+                            <a:schemeClr val="tx1"/>
+                          </a:solidFill>
+                        </a:rPr>
+                        <a:t>    </a:t>
+                      </a:r>
+                      <a:r>
+                        <a:rPr lang="en-US" dirty="0" err="1" smtClean="0">
+                          <a:solidFill>
+                            <a:schemeClr val="tx1"/>
+                          </a:solidFill>
+                        </a:rPr>
+                        <a:t>cudaMalloc</a:t>
+                      </a:r>
+                      <a:r>
+                        <a:rPr lang="en-US" dirty="0" smtClean="0">
+                          <a:solidFill>
+                            <a:schemeClr val="tx1"/>
+                          </a:solidFill>
+                        </a:rPr>
+                        <a:t>(&amp;</a:t>
+                      </a:r>
+                      <a:r>
+                        <a:rPr lang="en-US" dirty="0" err="1" smtClean="0">
+                          <a:solidFill>
+                            <a:schemeClr val="tx1"/>
+                          </a:solidFill>
+                        </a:rPr>
+                        <a:t>d_b</a:t>
+                      </a:r>
+                      <a:r>
+                        <a:rPr lang="en-US" dirty="0" smtClean="0">
+                          <a:solidFill>
+                            <a:schemeClr val="tx1"/>
+                          </a:solidFill>
+                        </a:rPr>
+                        <a:t>, bytes); </a:t>
+                      </a:r>
+                    </a:p>
+                    <a:p>
+                      <a:pPr marL="0" marR="0" indent="0" algn="l" defTabSz="914400" rtl="0" eaLnBrk="1" fontAlgn="auto" latinLnBrk="0" hangingPunct="1">
+                        <a:lnSpc>
+                          <a:spcPct val="100000"/>
+                        </a:lnSpc>
+                        <a:spcBef>
+                          <a:spcPts val="0"/>
+                        </a:spcBef>
+                        <a:spcAft>
+                          <a:spcPts val="0"/>
+                        </a:spcAft>
+                        <a:buClrTx/>
+                        <a:buSzTx/>
+                        <a:buFontTx/>
+                        <a:buNone/>
+                        <a:tabLst/>
+                        <a:defRPr/>
+                      </a:pPr>
+                      <a:r>
+                        <a:rPr lang="en-US" sz="1800" b="1" kern="1200" dirty="0" smtClean="0">
+                          <a:solidFill>
+                            <a:schemeClr val="tx1"/>
+                          </a:solidFill>
+                          <a:effectLst/>
+                          <a:latin typeface="+mn-lt"/>
+                          <a:ea typeface="+mn-ea"/>
+                          <a:cs typeface="+mn-cs"/>
+                        </a:rPr>
+                        <a:t>    // Copy host vectors to device    </a:t>
+                      </a:r>
+                    </a:p>
+                    <a:p>
+                      <a:pPr marL="0" marR="0" indent="0" algn="l" defTabSz="914400" rtl="0" eaLnBrk="1" fontAlgn="auto" latinLnBrk="0" hangingPunct="1">
+                        <a:lnSpc>
+                          <a:spcPct val="100000"/>
+                        </a:lnSpc>
+                        <a:spcBef>
+                          <a:spcPts val="0"/>
+                        </a:spcBef>
+                        <a:spcAft>
+                          <a:spcPts val="0"/>
+                        </a:spcAft>
+                        <a:buClrTx/>
+                        <a:buSzTx/>
+                        <a:buFontTx/>
+                        <a:buNone/>
+                        <a:tabLst/>
+                        <a:defRPr/>
+                      </a:pPr>
+                      <a:r>
+                        <a:rPr lang="en-US" sz="1800" b="1" kern="1200" dirty="0" smtClean="0">
+                          <a:solidFill>
+                            <a:schemeClr val="tx1"/>
+                          </a:solidFill>
+                          <a:effectLst/>
+                          <a:latin typeface="+mn-lt"/>
+                          <a:ea typeface="+mn-ea"/>
+                          <a:cs typeface="+mn-cs"/>
+                        </a:rPr>
+                        <a:t>    </a:t>
+                      </a:r>
+                      <a:r>
+                        <a:rPr lang="en-US" sz="1800" b="1" kern="1200" dirty="0" err="1" smtClean="0">
+                          <a:solidFill>
+                            <a:schemeClr val="tx1"/>
+                          </a:solidFill>
+                          <a:effectLst/>
+                          <a:latin typeface="+mn-lt"/>
+                          <a:ea typeface="+mn-ea"/>
+                          <a:cs typeface="+mn-cs"/>
+                        </a:rPr>
+                        <a:t>cudaMemcpy</a:t>
+                      </a:r>
+                      <a:r>
+                        <a:rPr lang="en-US" sz="1800" b="1" kern="1200" dirty="0" smtClean="0">
+                          <a:solidFill>
+                            <a:schemeClr val="tx1"/>
+                          </a:solidFill>
+                          <a:effectLst/>
+                          <a:latin typeface="+mn-lt"/>
+                          <a:ea typeface="+mn-ea"/>
+                          <a:cs typeface="+mn-cs"/>
+                        </a:rPr>
+                        <a:t>( </a:t>
+                      </a:r>
+                      <a:r>
+                        <a:rPr lang="en-US" sz="1800" b="1" kern="1200" dirty="0" err="1" smtClean="0">
+                          <a:solidFill>
+                            <a:schemeClr val="tx1"/>
+                          </a:solidFill>
+                          <a:effectLst/>
+                          <a:latin typeface="+mn-lt"/>
+                          <a:ea typeface="+mn-ea"/>
+                          <a:cs typeface="+mn-cs"/>
+                        </a:rPr>
+                        <a:t>d_a</a:t>
+                      </a:r>
+                      <a:r>
+                        <a:rPr lang="en-US" sz="1800" b="1" kern="1200" dirty="0" smtClean="0">
+                          <a:solidFill>
+                            <a:schemeClr val="tx1"/>
+                          </a:solidFill>
+                          <a:effectLst/>
+                          <a:latin typeface="+mn-lt"/>
+                          <a:ea typeface="+mn-ea"/>
+                          <a:cs typeface="+mn-cs"/>
+                        </a:rPr>
+                        <a:t>, </a:t>
+                      </a:r>
+                      <a:r>
+                        <a:rPr lang="en-US" sz="1800" b="1" kern="1200" dirty="0" err="1" smtClean="0">
+                          <a:solidFill>
+                            <a:schemeClr val="tx1"/>
+                          </a:solidFill>
+                          <a:effectLst/>
+                          <a:latin typeface="+mn-lt"/>
+                          <a:ea typeface="+mn-ea"/>
+                          <a:cs typeface="+mn-cs"/>
+                        </a:rPr>
+                        <a:t>h_a</a:t>
+                      </a:r>
+                      <a:r>
+                        <a:rPr lang="en-US" sz="1800" b="1" kern="1200" dirty="0" smtClean="0">
+                          <a:solidFill>
+                            <a:schemeClr val="tx1"/>
+                          </a:solidFill>
+                          <a:effectLst/>
+                          <a:latin typeface="+mn-lt"/>
+                          <a:ea typeface="+mn-ea"/>
+                          <a:cs typeface="+mn-cs"/>
+                        </a:rPr>
+                        <a:t>, bytes, </a:t>
+                      </a:r>
+                      <a:r>
+                        <a:rPr lang="en-US" sz="1800" b="1" kern="1200" dirty="0" err="1" smtClean="0">
+                          <a:solidFill>
+                            <a:schemeClr val="tx1"/>
+                          </a:solidFill>
+                          <a:effectLst/>
+                          <a:latin typeface="+mn-lt"/>
+                          <a:ea typeface="+mn-ea"/>
+                          <a:cs typeface="+mn-cs"/>
+                        </a:rPr>
+                        <a:t>cudaMemcpyHostToDevice</a:t>
+                      </a:r>
+                      <a:r>
+                        <a:rPr lang="en-US" sz="1800" b="1" kern="1200" dirty="0" smtClean="0">
+                          <a:solidFill>
+                            <a:schemeClr val="tx1"/>
+                          </a:solidFill>
+                          <a:effectLst/>
+                          <a:latin typeface="+mn-lt"/>
+                          <a:ea typeface="+mn-ea"/>
+                          <a:cs typeface="+mn-cs"/>
+                        </a:rPr>
+                        <a:t>);    </a:t>
+                      </a:r>
+                    </a:p>
+                    <a:p>
+                      <a:pPr marL="0" marR="0" indent="0" algn="l" defTabSz="914400" rtl="0" eaLnBrk="1" fontAlgn="auto" latinLnBrk="0" hangingPunct="1">
+                        <a:lnSpc>
+                          <a:spcPct val="100000"/>
+                        </a:lnSpc>
+                        <a:spcBef>
+                          <a:spcPts val="0"/>
+                        </a:spcBef>
+                        <a:spcAft>
+                          <a:spcPts val="0"/>
+                        </a:spcAft>
+                        <a:buClrTx/>
+                        <a:buSzTx/>
+                        <a:buFontTx/>
+                        <a:buNone/>
+                        <a:tabLst/>
+                        <a:defRPr/>
+                      </a:pPr>
+                      <a:r>
+                        <a:rPr lang="en-US" sz="1800" b="1" kern="1200" dirty="0" smtClean="0">
+                          <a:solidFill>
+                            <a:schemeClr val="tx1"/>
+                          </a:solidFill>
+                          <a:effectLst/>
+                          <a:latin typeface="+mn-lt"/>
+                          <a:ea typeface="+mn-ea"/>
+                          <a:cs typeface="+mn-cs"/>
+                        </a:rPr>
+                        <a:t>    </a:t>
+                      </a:r>
+                      <a:r>
+                        <a:rPr lang="en-US" sz="1800" b="1" kern="1200" dirty="0" err="1" smtClean="0">
+                          <a:solidFill>
+                            <a:schemeClr val="tx1"/>
+                          </a:solidFill>
+                          <a:effectLst/>
+                          <a:latin typeface="+mn-lt"/>
+                          <a:ea typeface="+mn-ea"/>
+                          <a:cs typeface="+mn-cs"/>
+                        </a:rPr>
+                        <a:t>cudaMemcpy</a:t>
+                      </a:r>
+                      <a:r>
+                        <a:rPr lang="en-US" sz="1800" b="1" kern="1200" dirty="0" smtClean="0">
+                          <a:solidFill>
+                            <a:schemeClr val="tx1"/>
+                          </a:solidFill>
+                          <a:effectLst/>
+                          <a:latin typeface="+mn-lt"/>
+                          <a:ea typeface="+mn-ea"/>
+                          <a:cs typeface="+mn-cs"/>
+                        </a:rPr>
+                        <a:t>( </a:t>
+                      </a:r>
+                      <a:r>
+                        <a:rPr lang="en-US" sz="1800" b="1" kern="1200" dirty="0" err="1" smtClean="0">
+                          <a:solidFill>
+                            <a:schemeClr val="tx1"/>
+                          </a:solidFill>
+                          <a:effectLst/>
+                          <a:latin typeface="+mn-lt"/>
+                          <a:ea typeface="+mn-ea"/>
+                          <a:cs typeface="+mn-cs"/>
+                        </a:rPr>
+                        <a:t>d_b</a:t>
+                      </a:r>
+                      <a:r>
+                        <a:rPr lang="en-US" sz="1800" b="1" kern="1200" dirty="0" smtClean="0">
+                          <a:solidFill>
+                            <a:schemeClr val="tx1"/>
+                          </a:solidFill>
+                          <a:effectLst/>
+                          <a:latin typeface="+mn-lt"/>
+                          <a:ea typeface="+mn-ea"/>
+                          <a:cs typeface="+mn-cs"/>
+                        </a:rPr>
+                        <a:t>, </a:t>
+                      </a:r>
+                      <a:r>
+                        <a:rPr lang="en-US" sz="1800" b="1" kern="1200" dirty="0" err="1" smtClean="0">
+                          <a:solidFill>
+                            <a:schemeClr val="tx1"/>
+                          </a:solidFill>
+                          <a:effectLst/>
+                          <a:latin typeface="+mn-lt"/>
+                          <a:ea typeface="+mn-ea"/>
+                          <a:cs typeface="+mn-cs"/>
+                        </a:rPr>
+                        <a:t>h_b</a:t>
+                      </a:r>
+                      <a:r>
+                        <a:rPr lang="en-US" sz="1800" b="1" kern="1200" dirty="0" smtClean="0">
+                          <a:solidFill>
+                            <a:schemeClr val="tx1"/>
+                          </a:solidFill>
+                          <a:effectLst/>
+                          <a:latin typeface="+mn-lt"/>
+                          <a:ea typeface="+mn-ea"/>
+                          <a:cs typeface="+mn-cs"/>
+                        </a:rPr>
+                        <a:t>, bytes, </a:t>
+                      </a:r>
+                      <a:r>
+                        <a:rPr lang="en-US" sz="1800" b="1" kern="1200" dirty="0" err="1" smtClean="0">
+                          <a:solidFill>
+                            <a:schemeClr val="tx1"/>
+                          </a:solidFill>
+                          <a:effectLst/>
+                          <a:latin typeface="+mn-lt"/>
+                          <a:ea typeface="+mn-ea"/>
+                          <a:cs typeface="+mn-cs"/>
+                        </a:rPr>
+                        <a:t>cudaMemcpyHostToDevice</a:t>
+                      </a:r>
+                      <a:r>
+                        <a:rPr lang="en-US" sz="1800" b="1" kern="1200" dirty="0" smtClean="0">
+                          <a:solidFill>
+                            <a:schemeClr val="tx1"/>
+                          </a:solidFill>
+                          <a:effectLst/>
+                          <a:latin typeface="+mn-lt"/>
+                          <a:ea typeface="+mn-ea"/>
+                          <a:cs typeface="+mn-cs"/>
+                        </a:rPr>
+                        <a:t>);</a:t>
+                      </a:r>
+                    </a:p>
+                    <a:p>
+                      <a:pPr marL="0" marR="0" indent="0" algn="l" defTabSz="914400" rtl="0" eaLnBrk="1" fontAlgn="auto" latinLnBrk="0" hangingPunct="1">
+                        <a:lnSpc>
+                          <a:spcPct val="100000"/>
+                        </a:lnSpc>
+                        <a:spcBef>
+                          <a:spcPts val="0"/>
+                        </a:spcBef>
+                        <a:spcAft>
+                          <a:spcPts val="0"/>
+                        </a:spcAft>
+                        <a:buClrTx/>
+                        <a:buSzTx/>
+                        <a:buFontTx/>
+                        <a:buNone/>
+                        <a:tabLst/>
+                        <a:defRPr/>
+                      </a:pPr>
+                      <a:r>
+                        <a:rPr lang="en-US" sz="1800" b="1" kern="1200" dirty="0" smtClean="0">
+                          <a:solidFill>
+                            <a:schemeClr val="tx1"/>
+                          </a:solidFill>
+                          <a:effectLst/>
+                          <a:latin typeface="+mn-lt"/>
+                          <a:ea typeface="+mn-ea"/>
+                          <a:cs typeface="+mn-cs"/>
+                        </a:rPr>
+                        <a:t>    </a:t>
+                      </a:r>
+                      <a:r>
+                        <a:rPr lang="en-US" sz="1800" b="1" kern="1200" dirty="0" smtClean="0">
+                          <a:solidFill>
+                            <a:schemeClr val="tx1"/>
+                          </a:solidFill>
+                          <a:effectLst/>
+                          <a:latin typeface="+mn-lt"/>
+                          <a:ea typeface="+mn-ea"/>
+                          <a:cs typeface="+mn-cs"/>
+                        </a:rPr>
+                        <a:t>//Copy</a:t>
+                      </a:r>
+                      <a:r>
+                        <a:rPr lang="en-US" sz="1800" b="1" kern="1200" baseline="0" dirty="0" smtClean="0">
+                          <a:solidFill>
+                            <a:schemeClr val="tx1"/>
+                          </a:solidFill>
+                          <a:effectLst/>
+                          <a:latin typeface="+mn-lt"/>
+                          <a:ea typeface="+mn-ea"/>
+                          <a:cs typeface="+mn-cs"/>
+                        </a:rPr>
+                        <a:t> </a:t>
+                      </a:r>
+                      <a:r>
+                        <a:rPr lang="en-US" sz="1800" b="1" kern="1200" baseline="0" smtClean="0">
+                          <a:solidFill>
+                            <a:schemeClr val="tx1"/>
+                          </a:solidFill>
+                          <a:effectLst/>
+                          <a:latin typeface="+mn-lt"/>
+                          <a:ea typeface="+mn-ea"/>
+                          <a:cs typeface="+mn-cs"/>
+                        </a:rPr>
+                        <a:t>to constant memory</a:t>
+                      </a:r>
+                      <a:endParaRPr lang="en-US" sz="1800" b="1" kern="1200" dirty="0" smtClean="0">
+                        <a:solidFill>
+                          <a:schemeClr val="tx1"/>
+                        </a:solidFill>
+                        <a:effectLst/>
+                        <a:latin typeface="+mn-lt"/>
+                        <a:ea typeface="+mn-ea"/>
+                        <a:cs typeface="+mn-cs"/>
+                      </a:endParaRPr>
+                    </a:p>
+                    <a:p>
+                      <a:r>
+                        <a:rPr lang="en-US" dirty="0" smtClean="0">
+                          <a:solidFill>
+                            <a:schemeClr val="tx1"/>
+                          </a:solidFill>
+                        </a:rPr>
+                        <a:t>    </a:t>
+                      </a:r>
+                      <a:r>
+                        <a:rPr lang="en-US" dirty="0" err="1" smtClean="0">
+                          <a:solidFill>
+                            <a:schemeClr val="tx1"/>
+                          </a:solidFill>
+                        </a:rPr>
+                        <a:t>cudaMemcpyToSymbol</a:t>
+                      </a:r>
+                      <a:r>
+                        <a:rPr lang="en-US" dirty="0" smtClean="0">
+                          <a:solidFill>
+                            <a:schemeClr val="tx1"/>
+                          </a:solidFill>
+                        </a:rPr>
+                        <a:t>(</a:t>
+                      </a:r>
+                      <a:r>
+                        <a:rPr lang="en-US" dirty="0" err="1" smtClean="0">
+                          <a:solidFill>
+                            <a:schemeClr val="tx1"/>
+                          </a:solidFill>
+                        </a:rPr>
+                        <a:t>c_a</a:t>
+                      </a:r>
+                      <a:r>
+                        <a:rPr lang="en-US" dirty="0" smtClean="0">
+                          <a:solidFill>
+                            <a:schemeClr val="tx1"/>
+                          </a:solidFill>
+                        </a:rPr>
+                        <a:t>, </a:t>
+                      </a:r>
+                      <a:r>
+                        <a:rPr lang="en-US" dirty="0" err="1" smtClean="0">
+                          <a:solidFill>
+                            <a:schemeClr val="tx1"/>
+                          </a:solidFill>
+                        </a:rPr>
+                        <a:t>h_a</a:t>
+                      </a:r>
+                      <a:r>
+                        <a:rPr lang="en-US" dirty="0" smtClean="0">
+                          <a:solidFill>
+                            <a:schemeClr val="tx1"/>
+                          </a:solidFill>
+                        </a:rPr>
+                        <a:t>, N * </a:t>
+                      </a:r>
+                      <a:r>
+                        <a:rPr lang="en-US" dirty="0" err="1" smtClean="0">
+                          <a:solidFill>
+                            <a:schemeClr val="tx1"/>
+                          </a:solidFill>
+                        </a:rPr>
+                        <a:t>sizeof</a:t>
+                      </a:r>
+                      <a:r>
+                        <a:rPr lang="en-US" dirty="0" smtClean="0">
+                          <a:solidFill>
+                            <a:schemeClr val="tx1"/>
+                          </a:solidFill>
+                        </a:rPr>
+                        <a:t>(float));</a:t>
+                      </a:r>
+                    </a:p>
+                    <a:p>
+                      <a:r>
+                        <a:rPr lang="en-US" dirty="0" smtClean="0">
+                          <a:solidFill>
+                            <a:schemeClr val="tx1"/>
+                          </a:solidFill>
+                        </a:rPr>
+                        <a:t>    </a:t>
+                      </a:r>
+                      <a:r>
+                        <a:rPr lang="en-US" dirty="0" err="1" smtClean="0">
+                          <a:solidFill>
+                            <a:schemeClr val="tx1"/>
+                          </a:solidFill>
+                        </a:rPr>
+                        <a:t>cudaMemcpyToSymbol</a:t>
+                      </a:r>
+                      <a:r>
+                        <a:rPr lang="en-US" dirty="0" smtClean="0">
+                          <a:solidFill>
+                            <a:schemeClr val="tx1"/>
+                          </a:solidFill>
+                        </a:rPr>
+                        <a:t>(</a:t>
+                      </a:r>
+                      <a:r>
+                        <a:rPr lang="en-US" dirty="0" err="1" smtClean="0">
+                          <a:solidFill>
+                            <a:schemeClr val="tx1"/>
+                          </a:solidFill>
+                        </a:rPr>
+                        <a:t>c_b</a:t>
+                      </a:r>
+                      <a:r>
+                        <a:rPr lang="en-US" dirty="0" smtClean="0">
+                          <a:solidFill>
+                            <a:schemeClr val="tx1"/>
+                          </a:solidFill>
+                        </a:rPr>
+                        <a:t>, </a:t>
+                      </a:r>
+                      <a:r>
+                        <a:rPr lang="en-US" dirty="0" err="1" smtClean="0">
+                          <a:solidFill>
+                            <a:schemeClr val="tx1"/>
+                          </a:solidFill>
+                        </a:rPr>
+                        <a:t>h_b</a:t>
+                      </a:r>
+                      <a:r>
+                        <a:rPr lang="en-US" dirty="0" smtClean="0">
+                          <a:solidFill>
+                            <a:schemeClr val="tx1"/>
+                          </a:solidFill>
+                        </a:rPr>
+                        <a:t>, N * </a:t>
+                      </a:r>
+                      <a:r>
+                        <a:rPr lang="en-US" dirty="0" err="1" smtClean="0">
+                          <a:solidFill>
+                            <a:schemeClr val="tx1"/>
+                          </a:solidFill>
+                        </a:rPr>
+                        <a:t>sizeof</a:t>
+                      </a:r>
+                      <a:r>
+                        <a:rPr lang="en-US" dirty="0" smtClean="0">
+                          <a:solidFill>
+                            <a:schemeClr val="tx1"/>
+                          </a:solidFill>
+                        </a:rPr>
+                        <a:t>(float));</a:t>
+                      </a:r>
+                    </a:p>
+                    <a:p>
+                      <a:pPr marL="0" marR="0" indent="0" algn="l" defTabSz="914400" rtl="0" eaLnBrk="1" fontAlgn="auto" latinLnBrk="0" hangingPunct="1">
+                        <a:lnSpc>
+                          <a:spcPct val="100000"/>
+                        </a:lnSpc>
+                        <a:spcBef>
+                          <a:spcPts val="0"/>
+                        </a:spcBef>
+                        <a:spcAft>
+                          <a:spcPts val="0"/>
+                        </a:spcAft>
+                        <a:buClrTx/>
+                        <a:buSzTx/>
+                        <a:buFontTx/>
+                        <a:buNone/>
+                        <a:tabLst/>
+                        <a:defRPr/>
+                      </a:pPr>
+                      <a:r>
+                        <a:rPr lang="en-US" baseline="0" dirty="0" smtClean="0">
+                          <a:solidFill>
+                            <a:schemeClr val="tx1"/>
+                          </a:solidFill>
+                        </a:rPr>
+                        <a:t>    //</a:t>
+                      </a:r>
+                      <a:r>
+                        <a:rPr lang="en-US" sz="1800" b="1" kern="1200" dirty="0" smtClean="0">
+                          <a:solidFill>
+                            <a:schemeClr val="tx1"/>
+                          </a:solidFill>
+                          <a:effectLst/>
+                          <a:latin typeface="+mn-lt"/>
+                          <a:ea typeface="+mn-ea"/>
+                          <a:cs typeface="+mn-cs"/>
+                        </a:rPr>
+                        <a:t>Execution</a:t>
+                      </a:r>
+                      <a:endParaRPr lang="en-US" baseline="0" dirty="0" smtClean="0">
+                        <a:solidFill>
+                          <a:schemeClr val="tx1"/>
+                        </a:solidFill>
+                      </a:endParaRPr>
+                    </a:p>
+                    <a:p>
+                      <a:r>
+                        <a:rPr lang="en-US" baseline="0" dirty="0" smtClean="0">
+                          <a:solidFill>
+                            <a:schemeClr val="tx1"/>
+                          </a:solidFill>
+                        </a:rPr>
+                        <a:t>     </a:t>
+                      </a:r>
+                      <a:r>
+                        <a:rPr lang="en-US" baseline="0" dirty="0" err="1" smtClean="0">
+                          <a:solidFill>
+                            <a:schemeClr val="tx1"/>
+                          </a:solidFill>
+                        </a:rPr>
+                        <a:t>vecAdd</a:t>
+                      </a:r>
+                      <a:r>
+                        <a:rPr lang="en-US" baseline="0" dirty="0" smtClean="0">
+                          <a:solidFill>
+                            <a:schemeClr val="tx1"/>
+                          </a:solidFill>
+                        </a:rPr>
+                        <a:t>&lt;&lt;&lt;</a:t>
+                      </a:r>
+                      <a:r>
+                        <a:rPr lang="en-US" baseline="0" dirty="0" err="1" smtClean="0">
+                          <a:solidFill>
+                            <a:schemeClr val="tx1"/>
+                          </a:solidFill>
+                        </a:rPr>
+                        <a:t>gridSize</a:t>
+                      </a:r>
+                      <a:r>
+                        <a:rPr lang="en-US" baseline="0" dirty="0" smtClean="0">
+                          <a:solidFill>
+                            <a:schemeClr val="tx1"/>
+                          </a:solidFill>
+                        </a:rPr>
+                        <a:t>, </a:t>
+                      </a:r>
+                      <a:r>
+                        <a:rPr lang="en-US" baseline="0" dirty="0" err="1" smtClean="0">
+                          <a:solidFill>
+                            <a:schemeClr val="tx1"/>
+                          </a:solidFill>
+                        </a:rPr>
+                        <a:t>blockSize</a:t>
+                      </a:r>
+                      <a:r>
+                        <a:rPr lang="en-US" baseline="0" dirty="0" smtClean="0">
+                          <a:solidFill>
+                            <a:schemeClr val="tx1"/>
+                          </a:solidFill>
+                        </a:rPr>
+                        <a:t>&gt;&gt;&gt;(</a:t>
+                      </a:r>
+                      <a:r>
+                        <a:rPr lang="en-US" baseline="0" dirty="0" err="1" smtClean="0">
+                          <a:solidFill>
+                            <a:schemeClr val="tx1"/>
+                          </a:solidFill>
+                        </a:rPr>
+                        <a:t>d_c</a:t>
+                      </a:r>
+                      <a:r>
+                        <a:rPr lang="en-US" baseline="0" dirty="0" smtClean="0">
+                          <a:solidFill>
+                            <a:schemeClr val="tx1"/>
+                          </a:solidFill>
+                        </a:rPr>
+                        <a:t>);</a:t>
+                      </a:r>
+                      <a:endParaRPr lang="en-US" dirty="0" smtClean="0">
+                        <a:solidFill>
+                          <a:schemeClr val="tx1"/>
+                        </a:solidFill>
+                      </a:endParaRPr>
                     </a:p>
                     <a:p>
                       <a:r>
@@ -5041,6 +7313,22 @@
                       </a:r>
                     </a:p>
                     <a:p>
+                      <a:r>
+                        <a:rPr lang="en-US" sz="1800" b="1" dirty="0" smtClean="0">
+                          <a:solidFill>
+                            <a:schemeClr val="tx1"/>
+                          </a:solidFill>
+                        </a:rPr>
+                        <a:t>//Data</a:t>
+                      </a:r>
+                      <a:r>
+                        <a:rPr lang="en-US" sz="1800" b="1" baseline="0" dirty="0" smtClean="0">
+                          <a:solidFill>
+                            <a:schemeClr val="tx1"/>
+                          </a:solidFill>
+                        </a:rPr>
+                        <a:t> object 1</a:t>
+                      </a:r>
                       <a:endParaRPr lang="en-US" sz="1800" b="1" dirty="0" smtClean="0">
                         <a:solidFill>
                           <a:schemeClr val="tx1"/>
@@ -5054,55 +7342,8 @@
                             <a:schemeClr val="tx1"/>
                           </a:solidFill>
                         </a:rPr>
-                        <a:t>//Data</a:t>
-                      </a:r>
-                      <a:r>
-                        <a:rPr lang="en-US" sz="1800" b="1" baseline="0" dirty="0" smtClean="0">
-                          <a:solidFill>
-                            <a:schemeClr val="tx1"/>
-                          </a:solidFill>
-                        </a:rPr>
-                        <a:t> object 1</a:t>
-                      </a:r>
-                      <a:endParaRPr lang="en-US" sz="1800" b="1" dirty="0" smtClean="0">
-                        <a:solidFill>
-                          <a:schemeClr val="tx1"/>
-                        </a:solidFill>
-                      </a:endParaRPr>
-                    </a:p>
-                    <a:p>
-                      <a:r>
-                        <a:rPr lang="en-US" sz="1800" b="1" dirty="0" smtClean="0">
-                          <a:solidFill>
-                            <a:schemeClr val="tx1"/>
-                          </a:solidFill>
-                        </a:rPr>
                         <a:t>LDC R4, c[0x2][R2];</a:t>
                       </a:r>
-                    </a:p>
-                    <a:p>
-                      <a:pPr marL="0" marR="0" indent="0" algn="l" defTabSz="914400" rtl="0" eaLnBrk="1" fontAlgn="auto" latinLnBrk="0" hangingPunct="1">
-                        <a:lnSpc>
-                          <a:spcPct val="100000"/>
-                        </a:lnSpc>
-                        <a:spcBef>
-                          <a:spcPts val="0"/>
-                        </a:spcBef>
-                        <a:spcAft>
-                          <a:spcPts val="0"/>
-                        </a:spcAft>
-                        <a:buClrTx/>
-                        <a:buSzTx/>
-                        <a:buFontTx/>
-                        <a:buNone/>
-                        <a:tabLst/>
-                        <a:defRPr/>
-                      </a:pPr>
-                      <a:endParaRPr lang="en-US" sz="1800" b="1" dirty="0" smtClean="0">
-                        <a:solidFill>
-                          <a:schemeClr val="tx1"/>
-                        </a:solidFill>
-                      </a:endParaRPr>
                     </a:p>
                     <a:p>
                       <a:pPr marL="0" marR="0" indent="0" algn="l" defTabSz="914400" rtl="0" eaLnBrk="1" fontAlgn="auto" latinLnBrk="0" hangingPunct="1">
@@ -5264,14 +7505,14 @@
           <p:nvPr>
             <p:extLst>
               <p:ext uri="{D42A27DB-BD31-4B8C-83A1-F6EECF244321}">
-                <p14:modId xmlns:p14="http://schemas.microsoft.com/office/powerpoint/2010/main" val="305035701"/>
+                <p14:modId xmlns:p14="http://schemas.microsoft.com/office/powerpoint/2010/main" val="1366468858"/>
               </p:ext>
             </p:extLst>
           </p:nvPr>
         </p:nvGraphicFramePr>
         <p:xfrm>
           <a:off x="2032000" y="719666"/>
-          <a:ext cx="8128000" cy="5669280"/>
+          <a:ext cx="8128000" cy="8412480"/>
         </p:xfrm>
         <a:graphic>
           <a:graphicData uri="http://schemas.openxmlformats.org/drawingml/2006/table">
@@ -5571,6 +7812,588 @@
                           </a:solidFill>
                         </a:rPr>
                         <a:t>    }  </a:t>
+                      </a:r>
+                    </a:p>
+                    <a:p>
+                      <a:r>
+                        <a:rPr lang="en-US" dirty="0" smtClean="0">
+                          <a:solidFill>
+                            <a:schemeClr val="tx1"/>
+                          </a:solidFill>
+                        </a:rPr>
+                        <a:t>}</a:t>
+                      </a:r>
+                    </a:p>
+                    <a:p>
+                      <a:r>
+                        <a:rPr lang="en-US" dirty="0" smtClean="0">
+                          <a:solidFill>
+                            <a:schemeClr val="tx1"/>
+                          </a:solidFill>
+                        </a:rPr>
+                        <a:t>main(){</a:t>
+                      </a:r>
+                    </a:p>
+                    <a:p>
+                      <a:r>
+                        <a:rPr lang="en-US" dirty="0" smtClean="0">
+                          <a:solidFill>
+                            <a:schemeClr val="tx1"/>
+                          </a:solidFill>
+                        </a:rPr>
+                        <a:t>    </a:t>
+                      </a:r>
+                      <a:r>
+                        <a:rPr lang="en-US" baseline="0" dirty="0" smtClean="0">
+                          <a:solidFill>
+                            <a:schemeClr val="tx1"/>
+                          </a:solidFill>
+                        </a:rPr>
+                        <a:t> </a:t>
+                      </a:r>
+                      <a:r>
+                        <a:rPr lang="en-US" dirty="0" smtClean="0">
+                          <a:solidFill>
+                            <a:schemeClr val="tx1"/>
+                          </a:solidFill>
+                        </a:rPr>
+                        <a:t>// Allocate memory for each vector on GPU    </a:t>
+                      </a:r>
+                    </a:p>
+                    <a:p>
+                      <a:r>
+                        <a:rPr lang="en-US" dirty="0" smtClean="0">
+                          <a:solidFill>
+                            <a:schemeClr val="tx1"/>
+                          </a:solidFill>
+                        </a:rPr>
+                        <a:t>    </a:t>
+                      </a:r>
+                      <a:r>
+                        <a:rPr lang="en-US" dirty="0" err="1" smtClean="0">
+                          <a:solidFill>
+                            <a:schemeClr val="tx1"/>
+                          </a:solidFill>
+                        </a:rPr>
+                        <a:t>cudaMalloc</a:t>
+                      </a:r>
+                      <a:r>
+                        <a:rPr lang="en-US" dirty="0" smtClean="0">
+                          <a:solidFill>
+                            <a:schemeClr val="tx1"/>
+                          </a:solidFill>
+                        </a:rPr>
+                        <a:t>(&amp;</a:t>
+                      </a:r>
+                      <a:r>
+                        <a:rPr lang="en-US" dirty="0" err="1" smtClean="0">
+                          <a:solidFill>
+                            <a:schemeClr val="tx1"/>
+                          </a:solidFill>
+                        </a:rPr>
+                        <a:t>d_a</a:t>
+                      </a:r>
+                      <a:r>
+                        <a:rPr lang="en-US" dirty="0" smtClean="0">
+                          <a:solidFill>
+                            <a:schemeClr val="tx1"/>
+                          </a:solidFill>
+                        </a:rPr>
+                        <a:t>, bytes);    </a:t>
+                      </a:r>
+                    </a:p>
+                    <a:p>
+                      <a:r>
+                        <a:rPr lang="en-US" dirty="0" smtClean="0">
+                          <a:solidFill>
+                            <a:schemeClr val="tx1"/>
+                          </a:solidFill>
+                        </a:rPr>
+                        <a:t>    </a:t>
+                      </a:r>
+                      <a:r>
+                        <a:rPr lang="en-US" dirty="0" err="1" smtClean="0">
+                          <a:solidFill>
+                            <a:schemeClr val="tx1"/>
+                          </a:solidFill>
+                        </a:rPr>
+                        <a:t>cudaMalloc</a:t>
+                      </a:r>
+                      <a:r>
+                        <a:rPr lang="en-US" dirty="0" smtClean="0">
+                          <a:solidFill>
+                            <a:schemeClr val="tx1"/>
+                          </a:solidFill>
+                        </a:rPr>
+                        <a:t>(&amp;</a:t>
+                      </a:r>
+                      <a:r>
+                        <a:rPr lang="en-US" dirty="0" err="1" smtClean="0">
+                          <a:solidFill>
+                            <a:schemeClr val="tx1"/>
+                          </a:solidFill>
+                        </a:rPr>
+                        <a:t>d_b</a:t>
+                      </a:r>
+                      <a:r>
+                        <a:rPr lang="en-US" dirty="0" smtClean="0">
+                          <a:solidFill>
+                            <a:schemeClr val="tx1"/>
+                          </a:solidFill>
+                        </a:rPr>
+                        <a:t>, bytes); </a:t>
+                      </a:r>
+                    </a:p>
+                    <a:p>
+                      <a:pPr marL="0" marR="0" indent="0" algn="l" defTabSz="914400" rtl="0" eaLnBrk="1" fontAlgn="auto" latinLnBrk="0" hangingPunct="1">
+                        <a:lnSpc>
+                          <a:spcPct val="100000"/>
+                        </a:lnSpc>
+                        <a:spcBef>
+                          <a:spcPts val="0"/>
+                        </a:spcBef>
+                        <a:spcAft>
+                          <a:spcPts val="0"/>
+                        </a:spcAft>
+                        <a:buClrTx/>
+                        <a:buSzTx/>
+                        <a:buFontTx/>
+                        <a:buNone/>
+                        <a:tabLst/>
+                        <a:defRPr/>
+                      </a:pPr>
+                      <a:r>
+                        <a:rPr lang="en-US" sz="1800" b="1" kern="1200" dirty="0" smtClean="0">
+                          <a:solidFill>
+                            <a:schemeClr val="tx1"/>
+                          </a:solidFill>
+                          <a:effectLst/>
+                          <a:latin typeface="+mn-lt"/>
+                          <a:ea typeface="+mn-ea"/>
+                          <a:cs typeface="+mn-cs"/>
+                        </a:rPr>
+                        <a:t>    // Copy host vectors to device    </a:t>
+                      </a:r>
+                    </a:p>
+                    <a:p>
+                      <a:pPr marL="0" marR="0" indent="0" algn="l" defTabSz="914400" rtl="0" eaLnBrk="1" fontAlgn="auto" latinLnBrk="0" hangingPunct="1">
+                        <a:lnSpc>
+                          <a:spcPct val="100000"/>
+                        </a:lnSpc>
+                        <a:spcBef>
+                          <a:spcPts val="0"/>
+                        </a:spcBef>
+                        <a:spcAft>
+                          <a:spcPts val="0"/>
+                        </a:spcAft>
+                        <a:buClrTx/>
+                        <a:buSzTx/>
+                        <a:buFontTx/>
+                        <a:buNone/>
+                        <a:tabLst/>
+                        <a:defRPr/>
+                      </a:pPr>
+                      <a:r>
+                        <a:rPr lang="en-US" sz="1800" b="1" kern="1200" dirty="0" smtClean="0">
+                          <a:solidFill>
+                            <a:schemeClr val="tx1"/>
+                          </a:solidFill>
+                          <a:effectLst/>
+                          <a:latin typeface="+mn-lt"/>
+                          <a:ea typeface="+mn-ea"/>
+                          <a:cs typeface="+mn-cs"/>
+                        </a:rPr>
+                        <a:t>    </a:t>
+                      </a:r>
+                      <a:r>
+                        <a:rPr lang="en-US" sz="1800" b="1" kern="1200" dirty="0" err="1" smtClean="0">
+                          <a:solidFill>
+                            <a:schemeClr val="tx1"/>
+                          </a:solidFill>
+                          <a:effectLst/>
+                          <a:latin typeface="+mn-lt"/>
+                          <a:ea typeface="+mn-ea"/>
+                          <a:cs typeface="+mn-cs"/>
+                        </a:rPr>
+                        <a:t>cudaMemcpy</a:t>
+                      </a:r>
+                      <a:r>
+                        <a:rPr lang="en-US" sz="1800" b="1" kern="1200" dirty="0" smtClean="0">
+                          <a:solidFill>
+                            <a:schemeClr val="tx1"/>
+                          </a:solidFill>
+                          <a:effectLst/>
+                          <a:latin typeface="+mn-lt"/>
+                          <a:ea typeface="+mn-ea"/>
+                          <a:cs typeface="+mn-cs"/>
+                        </a:rPr>
+                        <a:t>( </a:t>
+                      </a:r>
+                      <a:r>
+                        <a:rPr lang="en-US" sz="1800" b="1" kern="1200" dirty="0" err="1" smtClean="0">
+                          <a:solidFill>
+                            <a:schemeClr val="tx1"/>
+                          </a:solidFill>
+                          <a:effectLst/>
+                          <a:latin typeface="+mn-lt"/>
+                          <a:ea typeface="+mn-ea"/>
+                          <a:cs typeface="+mn-cs"/>
+                        </a:rPr>
+                        <a:t>d_a</a:t>
+                      </a:r>
+                      <a:r>
+                        <a:rPr lang="en-US" sz="1800" b="1" kern="1200" dirty="0" smtClean="0">
+                          <a:solidFill>
+                            <a:schemeClr val="tx1"/>
+                          </a:solidFill>
+                          <a:effectLst/>
+                          <a:latin typeface="+mn-lt"/>
+                          <a:ea typeface="+mn-ea"/>
+                          <a:cs typeface="+mn-cs"/>
+                        </a:rPr>
+                        <a:t>, </a:t>
+                      </a:r>
+                      <a:r>
+                        <a:rPr lang="en-US" sz="1800" b="1" kern="1200" dirty="0" err="1" smtClean="0">
+                          <a:solidFill>
+                            <a:schemeClr val="tx1"/>
+                          </a:solidFill>
+                          <a:effectLst/>
+                          <a:latin typeface="+mn-lt"/>
+                          <a:ea typeface="+mn-ea"/>
+                          <a:cs typeface="+mn-cs"/>
+                        </a:rPr>
+                        <a:t>h_a</a:t>
+                      </a:r>
+                      <a:r>
+                        <a:rPr lang="en-US" sz="1800" b="1" kern="1200" dirty="0" smtClean="0">
+                          <a:solidFill>
+                            <a:schemeClr val="tx1"/>
+                          </a:solidFill>
+                          <a:effectLst/>
+                          <a:latin typeface="+mn-lt"/>
+                          <a:ea typeface="+mn-ea"/>
+                          <a:cs typeface="+mn-cs"/>
+                        </a:rPr>
+                        <a:t>, bytes, </a:t>
+                      </a:r>
+                      <a:r>
+                        <a:rPr lang="en-US" sz="1800" b="1" kern="1200" dirty="0" err="1" smtClean="0">
+                          <a:solidFill>
+                            <a:schemeClr val="tx1"/>
+                          </a:solidFill>
+                          <a:effectLst/>
+                          <a:latin typeface="+mn-lt"/>
+                          <a:ea typeface="+mn-ea"/>
+                          <a:cs typeface="+mn-cs"/>
+                        </a:rPr>
+                        <a:t>cudaMemcpyHostToDevice</a:t>
+                      </a:r>
+                      <a:r>
+                        <a:rPr lang="en-US" sz="1800" b="1" kern="1200" dirty="0" smtClean="0">
+                          <a:solidFill>
+                            <a:schemeClr val="tx1"/>
+                          </a:solidFill>
+                          <a:effectLst/>
+                          <a:latin typeface="+mn-lt"/>
+                          <a:ea typeface="+mn-ea"/>
+                          <a:cs typeface="+mn-cs"/>
+                        </a:rPr>
+                        <a:t>);    </a:t>
+                      </a:r>
+                    </a:p>
+                    <a:p>
+                      <a:pPr marL="0" marR="0" indent="0" algn="l" defTabSz="914400" rtl="0" eaLnBrk="1" fontAlgn="auto" latinLnBrk="0" hangingPunct="1">
+                        <a:lnSpc>
+                          <a:spcPct val="100000"/>
+                        </a:lnSpc>
+                        <a:spcBef>
+                          <a:spcPts val="0"/>
+                        </a:spcBef>
+                        <a:spcAft>
+                          <a:spcPts val="0"/>
+                        </a:spcAft>
+                        <a:buClrTx/>
+                        <a:buSzTx/>
+                        <a:buFontTx/>
+                        <a:buNone/>
+                        <a:tabLst/>
+                        <a:defRPr/>
+                      </a:pPr>
+                      <a:r>
+                        <a:rPr lang="en-US" sz="1800" b="1" kern="1200" dirty="0" smtClean="0">
+                          <a:solidFill>
+                            <a:schemeClr val="tx1"/>
+                          </a:solidFill>
+                          <a:effectLst/>
+                          <a:latin typeface="+mn-lt"/>
+                          <a:ea typeface="+mn-ea"/>
+                          <a:cs typeface="+mn-cs"/>
+                        </a:rPr>
+                        <a:t>    </a:t>
+                      </a:r>
+                      <a:r>
+                        <a:rPr lang="en-US" sz="1800" b="1" kern="1200" dirty="0" err="1" smtClean="0">
+                          <a:solidFill>
+                            <a:schemeClr val="tx1"/>
+                          </a:solidFill>
+                          <a:effectLst/>
+                          <a:latin typeface="+mn-lt"/>
+                          <a:ea typeface="+mn-ea"/>
+                          <a:cs typeface="+mn-cs"/>
+                        </a:rPr>
+                        <a:t>cudaMemcpy</a:t>
+                      </a:r>
+                      <a:r>
+                        <a:rPr lang="en-US" sz="1800" b="1" kern="1200" dirty="0" smtClean="0">
+                          <a:solidFill>
+                            <a:schemeClr val="tx1"/>
+                          </a:solidFill>
+                          <a:effectLst/>
+                          <a:latin typeface="+mn-lt"/>
+                          <a:ea typeface="+mn-ea"/>
+                          <a:cs typeface="+mn-cs"/>
+                        </a:rPr>
+                        <a:t>( </a:t>
+                      </a:r>
+                      <a:r>
+                        <a:rPr lang="en-US" sz="1800" b="1" kern="1200" dirty="0" err="1" smtClean="0">
+                          <a:solidFill>
+                            <a:schemeClr val="tx1"/>
+                          </a:solidFill>
+                          <a:effectLst/>
+                          <a:latin typeface="+mn-lt"/>
+                          <a:ea typeface="+mn-ea"/>
+                          <a:cs typeface="+mn-cs"/>
+                        </a:rPr>
+                        <a:t>d_b</a:t>
+                      </a:r>
+                      <a:r>
+                        <a:rPr lang="en-US" sz="1800" b="1" kern="1200" dirty="0" smtClean="0">
+                          <a:solidFill>
+                            <a:schemeClr val="tx1"/>
+                          </a:solidFill>
+                          <a:effectLst/>
+                          <a:latin typeface="+mn-lt"/>
+                          <a:ea typeface="+mn-ea"/>
+                          <a:cs typeface="+mn-cs"/>
+                        </a:rPr>
+                        <a:t>, </a:t>
+                      </a:r>
+                      <a:r>
+                        <a:rPr lang="en-US" sz="1800" b="1" kern="1200" dirty="0" err="1" smtClean="0">
+                          <a:solidFill>
+                            <a:schemeClr val="tx1"/>
+                          </a:solidFill>
+                          <a:effectLst/>
+                          <a:latin typeface="+mn-lt"/>
+                          <a:ea typeface="+mn-ea"/>
+                          <a:cs typeface="+mn-cs"/>
+                        </a:rPr>
+                        <a:t>h_b</a:t>
+                      </a:r>
+                      <a:r>
+                        <a:rPr lang="en-US" sz="1800" b="1" kern="1200" dirty="0" smtClean="0">
+                          <a:solidFill>
+                            <a:schemeClr val="tx1"/>
+                          </a:solidFill>
+                          <a:effectLst/>
+                          <a:latin typeface="+mn-lt"/>
+                          <a:ea typeface="+mn-ea"/>
+                          <a:cs typeface="+mn-cs"/>
+                        </a:rPr>
+                        <a:t>, bytes, </a:t>
+                      </a:r>
+                      <a:r>
+                        <a:rPr lang="en-US" sz="1800" b="1" kern="1200" dirty="0" err="1" smtClean="0">
+                          <a:solidFill>
+                            <a:schemeClr val="tx1"/>
+                          </a:solidFill>
+                          <a:effectLst/>
+                          <a:latin typeface="+mn-lt"/>
+                          <a:ea typeface="+mn-ea"/>
+                          <a:cs typeface="+mn-cs"/>
+                        </a:rPr>
+                        <a:t>cudaMemcpyHostToDevice</a:t>
+                      </a:r>
+                      <a:r>
+                        <a:rPr lang="en-US" sz="1800" b="1" kern="1200" dirty="0" smtClean="0">
+                          <a:solidFill>
+                            <a:schemeClr val="tx1"/>
+                          </a:solidFill>
+                          <a:effectLst/>
+                          <a:latin typeface="+mn-lt"/>
+                          <a:ea typeface="+mn-ea"/>
+                          <a:cs typeface="+mn-cs"/>
+                        </a:rPr>
+                        <a:t>);</a:t>
+                      </a:r>
+                    </a:p>
+                    <a:p>
+                      <a:pPr marL="0" marR="0" indent="0" algn="l" defTabSz="914400" rtl="0" eaLnBrk="1" fontAlgn="auto" latinLnBrk="0" hangingPunct="1">
+                        <a:lnSpc>
+                          <a:spcPct val="100000"/>
+                        </a:lnSpc>
+                        <a:spcBef>
+                          <a:spcPts val="0"/>
+                        </a:spcBef>
+                        <a:spcAft>
+                          <a:spcPts val="0"/>
+                        </a:spcAft>
+                        <a:buClrTx/>
+                        <a:buSzTx/>
+                        <a:buFontTx/>
+                        <a:buNone/>
+                        <a:tabLst/>
+                        <a:defRPr/>
+                      </a:pPr>
+                      <a:r>
+                        <a:rPr lang="en-US" dirty="0" smtClean="0">
+                          <a:solidFill>
+                            <a:schemeClr val="tx1"/>
+                          </a:solidFill>
+                        </a:rPr>
+                        <a:t>    //</a:t>
+                      </a:r>
+                      <a:r>
+                        <a:rPr lang="en-US" sz="1800" b="1" kern="1200" dirty="0" smtClean="0">
+                          <a:solidFill>
+                            <a:schemeClr val="tx1"/>
+                          </a:solidFill>
+                          <a:effectLst/>
+                          <a:latin typeface="+mn-lt"/>
+                          <a:ea typeface="+mn-ea"/>
+                          <a:cs typeface="+mn-cs"/>
+                        </a:rPr>
+                        <a:t>Execution</a:t>
+                      </a:r>
+                      <a:endParaRPr lang="en-US" dirty="0" smtClean="0">
+                        <a:solidFill>
+                          <a:schemeClr val="tx1"/>
+                        </a:solidFill>
+                      </a:endParaRPr>
+                    </a:p>
+                    <a:p>
+                      <a:pPr marL="0" marR="0" indent="0" algn="l" defTabSz="914400" rtl="0" eaLnBrk="1" fontAlgn="auto" latinLnBrk="0" hangingPunct="1">
+                        <a:lnSpc>
+                          <a:spcPct val="100000"/>
+                        </a:lnSpc>
+                        <a:spcBef>
+                          <a:spcPts val="0"/>
+                        </a:spcBef>
+                        <a:spcAft>
+                          <a:spcPts val="0"/>
+                        </a:spcAft>
+                        <a:buClrTx/>
+                        <a:buSzTx/>
+                        <a:buFontTx/>
+                        <a:buNone/>
+                        <a:tabLst/>
+                        <a:defRPr/>
+                      </a:pPr>
+                      <a:r>
+                        <a:rPr lang="en-US" dirty="0" smtClean="0">
+                          <a:solidFill>
+                            <a:schemeClr val="tx1"/>
+                          </a:solidFill>
+                        </a:rPr>
+                        <a:t>    </a:t>
+                      </a:r>
+                      <a:r>
+                        <a:rPr lang="en-US" dirty="0" err="1" smtClean="0">
+                          <a:solidFill>
+                            <a:schemeClr val="tx1"/>
+                          </a:solidFill>
+                        </a:rPr>
+                        <a:t>vecAdd</a:t>
+                      </a:r>
+                      <a:r>
+                        <a:rPr lang="en-US" dirty="0" smtClean="0">
+                          <a:solidFill>
+                            <a:schemeClr val="tx1"/>
+                          </a:solidFill>
+                        </a:rPr>
+                        <a:t>&lt;&lt;&lt;</a:t>
+                      </a:r>
+                      <a:r>
+                        <a:rPr lang="en-US" dirty="0" err="1" smtClean="0">
+                          <a:solidFill>
+                            <a:schemeClr val="tx1"/>
+                          </a:solidFill>
+                        </a:rPr>
+                        <a:t>gridSize</a:t>
+                      </a:r>
+                      <a:r>
+                        <a:rPr lang="en-US" dirty="0" smtClean="0">
+                          <a:solidFill>
+                            <a:schemeClr val="tx1"/>
+                          </a:solidFill>
+                        </a:rPr>
+                        <a:t>, </a:t>
+                      </a:r>
+                      <a:r>
+                        <a:rPr lang="en-US" dirty="0" err="1" smtClean="0">
+                          <a:solidFill>
+                            <a:schemeClr val="tx1"/>
+                          </a:solidFill>
+                        </a:rPr>
+                        <a:t>blockSize</a:t>
+                      </a:r>
+                      <a:r>
+                        <a:rPr lang="en-US" dirty="0" smtClean="0">
+                          <a:solidFill>
+                            <a:schemeClr val="tx1"/>
+                          </a:solidFill>
+                        </a:rPr>
+                        <a:t>&gt;&gt;&gt;(</a:t>
+                      </a:r>
+                      <a:r>
+                        <a:rPr lang="en-US" dirty="0" err="1" smtClean="0">
+                          <a:solidFill>
+                            <a:schemeClr val="tx1"/>
+                          </a:solidFill>
+                        </a:rPr>
+                        <a:t>d_a</a:t>
+                      </a:r>
+                      <a:r>
+                        <a:rPr lang="en-US" dirty="0" smtClean="0">
+                          <a:solidFill>
+                            <a:schemeClr val="tx1"/>
+                          </a:solidFill>
+                        </a:rPr>
+                        <a:t>, </a:t>
+                      </a:r>
+                      <a:r>
+                        <a:rPr lang="en-US" dirty="0" err="1" smtClean="0">
+                          <a:solidFill>
+                            <a:schemeClr val="tx1"/>
+                          </a:solidFill>
+                        </a:rPr>
+                        <a:t>d_b</a:t>
+                      </a:r>
+                      <a:r>
+                        <a:rPr lang="en-US" dirty="0" smtClean="0">
+                          <a:solidFill>
+                            <a:schemeClr val="tx1"/>
+                          </a:solidFill>
+                        </a:rPr>
+                        <a:t>, </a:t>
+                      </a:r>
+                      <a:r>
+                        <a:rPr lang="en-US" dirty="0" err="1" smtClean="0">
+                          <a:solidFill>
+                            <a:schemeClr val="tx1"/>
+                          </a:solidFill>
+                        </a:rPr>
+                        <a:t>d_c</a:t>
+                      </a:r>
+                      <a:r>
+                        <a:rPr lang="en-US" dirty="0" smtClean="0">
+                          <a:solidFill>
+                            <a:schemeClr val="tx1"/>
+                          </a:solidFill>
+                        </a:rPr>
+                        <a:t>);</a:t>
                       </a:r>
                     </a:p>
                     <a:p>

</xml_diff>